<commit_message>
update github and introduction
</commit_message>
<xml_diff>
--- a/css_tohoku/Figure/figure.pptx
+++ b/css_tohoku/Figure/figure.pptx
@@ -7,6 +7,8 @@
   <p:sldIdLst>
     <p:sldId id="256" r:id="rId2"/>
     <p:sldId id="257" r:id="rId3"/>
+    <p:sldId id="258" r:id="rId4"/>
+    <p:sldId id="259" r:id="rId5"/>
   </p:sldIdLst>
   <p:sldSz cx="12192000" cy="6858000"/>
   <p:notesSz cx="6858000" cy="9144000"/>
@@ -260,7 +262,7 @@
           <a:p>
             <a:fld id="{B8F1BDB9-036C-2049-9C6B-0278285C98B8}" type="datetimeFigureOut">
               <a:rPr kumimoji="1" lang="ja-JP" altLang="en-US" smtClean="0"/>
-              <a:t>2023/3/16</a:t>
+              <a:t>2023/3/24</a:t>
             </a:fld>
             <a:endParaRPr kumimoji="1" lang="ja-JP" altLang="en-US"/>
           </a:p>
@@ -490,7 +492,7 @@
           <a:p>
             <a:fld id="{B8F1BDB9-036C-2049-9C6B-0278285C98B8}" type="datetimeFigureOut">
               <a:rPr kumimoji="1" lang="ja-JP" altLang="en-US" smtClean="0"/>
-              <a:t>2023/3/16</a:t>
+              <a:t>2023/3/24</a:t>
             </a:fld>
             <a:endParaRPr kumimoji="1" lang="ja-JP" altLang="en-US"/>
           </a:p>
@@ -730,7 +732,7 @@
           <a:p>
             <a:fld id="{B8F1BDB9-036C-2049-9C6B-0278285C98B8}" type="datetimeFigureOut">
               <a:rPr kumimoji="1" lang="ja-JP" altLang="en-US" smtClean="0"/>
-              <a:t>2023/3/16</a:t>
+              <a:t>2023/3/24</a:t>
             </a:fld>
             <a:endParaRPr kumimoji="1" lang="ja-JP" altLang="en-US"/>
           </a:p>
@@ -960,7 +962,7 @@
           <a:p>
             <a:fld id="{B8F1BDB9-036C-2049-9C6B-0278285C98B8}" type="datetimeFigureOut">
               <a:rPr kumimoji="1" lang="ja-JP" altLang="en-US" smtClean="0"/>
-              <a:t>2023/3/16</a:t>
+              <a:t>2023/3/24</a:t>
             </a:fld>
             <a:endParaRPr kumimoji="1" lang="ja-JP" altLang="en-US"/>
           </a:p>
@@ -1235,7 +1237,7 @@
           <a:p>
             <a:fld id="{B8F1BDB9-036C-2049-9C6B-0278285C98B8}" type="datetimeFigureOut">
               <a:rPr kumimoji="1" lang="ja-JP" altLang="en-US" smtClean="0"/>
-              <a:t>2023/3/16</a:t>
+              <a:t>2023/3/24</a:t>
             </a:fld>
             <a:endParaRPr kumimoji="1" lang="ja-JP" altLang="en-US"/>
           </a:p>
@@ -1564,7 +1566,7 @@
           <a:p>
             <a:fld id="{B8F1BDB9-036C-2049-9C6B-0278285C98B8}" type="datetimeFigureOut">
               <a:rPr kumimoji="1" lang="ja-JP" altLang="en-US" smtClean="0"/>
-              <a:t>2023/3/16</a:t>
+              <a:t>2023/3/24</a:t>
             </a:fld>
             <a:endParaRPr kumimoji="1" lang="ja-JP" altLang="en-US"/>
           </a:p>
@@ -2040,7 +2042,7 @@
           <a:p>
             <a:fld id="{B8F1BDB9-036C-2049-9C6B-0278285C98B8}" type="datetimeFigureOut">
               <a:rPr kumimoji="1" lang="ja-JP" altLang="en-US" smtClean="0"/>
-              <a:t>2023/3/16</a:t>
+              <a:t>2023/3/24</a:t>
             </a:fld>
             <a:endParaRPr kumimoji="1" lang="ja-JP" altLang="en-US"/>
           </a:p>
@@ -2181,7 +2183,7 @@
           <a:p>
             <a:fld id="{B8F1BDB9-036C-2049-9C6B-0278285C98B8}" type="datetimeFigureOut">
               <a:rPr kumimoji="1" lang="ja-JP" altLang="en-US" smtClean="0"/>
-              <a:t>2023/3/16</a:t>
+              <a:t>2023/3/24</a:t>
             </a:fld>
             <a:endParaRPr kumimoji="1" lang="ja-JP" altLang="en-US"/>
           </a:p>
@@ -2294,7 +2296,7 @@
           <a:p>
             <a:fld id="{B8F1BDB9-036C-2049-9C6B-0278285C98B8}" type="datetimeFigureOut">
               <a:rPr kumimoji="1" lang="ja-JP" altLang="en-US" smtClean="0"/>
-              <a:t>2023/3/16</a:t>
+              <a:t>2023/3/24</a:t>
             </a:fld>
             <a:endParaRPr kumimoji="1" lang="ja-JP" altLang="en-US"/>
           </a:p>
@@ -2637,7 +2639,7 @@
           <a:p>
             <a:fld id="{B8F1BDB9-036C-2049-9C6B-0278285C98B8}" type="datetimeFigureOut">
               <a:rPr kumimoji="1" lang="ja-JP" altLang="en-US" smtClean="0"/>
-              <a:t>2023/3/16</a:t>
+              <a:t>2023/3/24</a:t>
             </a:fld>
             <a:endParaRPr kumimoji="1" lang="ja-JP" altLang="en-US"/>
           </a:p>
@@ -2925,7 +2927,7 @@
           <a:p>
             <a:fld id="{B8F1BDB9-036C-2049-9C6B-0278285C98B8}" type="datetimeFigureOut">
               <a:rPr kumimoji="1" lang="ja-JP" altLang="en-US" smtClean="0"/>
-              <a:t>2023/3/16</a:t>
+              <a:t>2023/3/24</a:t>
             </a:fld>
             <a:endParaRPr kumimoji="1" lang="ja-JP" altLang="en-US"/>
           </a:p>
@@ -3198,7 +3200,7 @@
           <a:p>
             <a:fld id="{B8F1BDB9-036C-2049-9C6B-0278285C98B8}" type="datetimeFigureOut">
               <a:rPr kumimoji="1" lang="ja-JP" altLang="en-US" smtClean="0"/>
-              <a:t>2023/3/16</a:t>
+              <a:t>2023/3/24</a:t>
             </a:fld>
             <a:endParaRPr kumimoji="1" lang="ja-JP" altLang="en-US"/>
           </a:p>
@@ -6109,6 +6111,2874 @@
 </p:sld>
 </file>
 
+<file path=ppt/slides/slide3.xml><?xml version="1.0" encoding="utf-8"?>
+<p:sld xmlns:a="http://schemas.openxmlformats.org/drawingml/2006/main" xmlns:r="http://schemas.openxmlformats.org/officeDocument/2006/relationships" xmlns:p="http://schemas.openxmlformats.org/presentationml/2006/main">
+  <p:cSld>
+    <p:spTree>
+      <p:nvGrpSpPr>
+        <p:cNvPr id="1" name=""/>
+        <p:cNvGrpSpPr/>
+        <p:nvPr/>
+      </p:nvGrpSpPr>
+      <p:grpSpPr>
+        <a:xfrm>
+          <a:off x="0" y="0"/>
+          <a:ext cx="0" cy="0"/>
+          <a:chOff x="0" y="0"/>
+          <a:chExt cx="0" cy="0"/>
+        </a:xfrm>
+      </p:grpSpPr>
+      <p:cxnSp>
+        <p:nvCxnSpPr>
+          <p:cNvPr id="5" name="直線コネクタ 4">
+            <a:extLst>
+              <a:ext uri="{FF2B5EF4-FFF2-40B4-BE49-F238E27FC236}">
+                <a16:creationId xmlns:a16="http://schemas.microsoft.com/office/drawing/2014/main" id="{2DA60F28-0158-5506-BB9D-B342518AD738}"/>
+              </a:ext>
+            </a:extLst>
+          </p:cNvPr>
+          <p:cNvCxnSpPr>
+            <a:cxnSpLocks/>
+          </p:cNvCxnSpPr>
+          <p:nvPr/>
+        </p:nvCxnSpPr>
+        <p:spPr>
+          <a:xfrm>
+            <a:off x="658174" y="4712360"/>
+            <a:ext cx="9969639" cy="0"/>
+          </a:xfrm>
+          <a:prstGeom prst="line">
+            <a:avLst/>
+          </a:prstGeom>
+          <a:ln w="19050">
+            <a:solidFill>
+              <a:schemeClr val="tx1"/>
+            </a:solidFill>
+            <a:prstDash val="dash"/>
+          </a:ln>
+        </p:spPr>
+        <p:style>
+          <a:lnRef idx="1">
+            <a:schemeClr val="dk1"/>
+          </a:lnRef>
+          <a:fillRef idx="0">
+            <a:schemeClr val="dk1"/>
+          </a:fillRef>
+          <a:effectRef idx="0">
+            <a:schemeClr val="dk1"/>
+          </a:effectRef>
+          <a:fontRef idx="minor">
+            <a:schemeClr val="tx1"/>
+          </a:fontRef>
+        </p:style>
+      </p:cxnSp>
+      <p:sp>
+        <p:nvSpPr>
+          <p:cNvPr id="6" name="円/楕円 5">
+            <a:extLst>
+              <a:ext uri="{FF2B5EF4-FFF2-40B4-BE49-F238E27FC236}">
+                <a16:creationId xmlns:a16="http://schemas.microsoft.com/office/drawing/2014/main" id="{4AE26DA0-EFFA-D866-1DC3-B6DCDC4B776E}"/>
+              </a:ext>
+            </a:extLst>
+          </p:cNvPr>
+          <p:cNvSpPr/>
+          <p:nvPr/>
+        </p:nvSpPr>
+        <p:spPr>
+          <a:xfrm>
+            <a:off x="2440901" y="3506989"/>
+            <a:ext cx="326571" cy="326571"/>
+          </a:xfrm>
+          <a:prstGeom prst="ellipse">
+            <a:avLst/>
+          </a:prstGeom>
+          <a:solidFill>
+            <a:schemeClr val="accent4"/>
+          </a:solidFill>
+          <a:ln>
+            <a:solidFill>
+              <a:schemeClr val="tx1"/>
+            </a:solidFill>
+          </a:ln>
+        </p:spPr>
+        <p:style>
+          <a:lnRef idx="2">
+            <a:schemeClr val="accent1">
+              <a:shade val="50000"/>
+            </a:schemeClr>
+          </a:lnRef>
+          <a:fillRef idx="1">
+            <a:schemeClr val="accent1"/>
+          </a:fillRef>
+          <a:effectRef idx="0">
+            <a:schemeClr val="accent1"/>
+          </a:effectRef>
+          <a:fontRef idx="minor">
+            <a:schemeClr val="lt1"/>
+          </a:fontRef>
+        </p:style>
+        <p:txBody>
+          <a:bodyPr rtlCol="0" anchor="ctr"/>
+          <a:lstStyle/>
+          <a:p>
+            <a:pPr algn="ctr"/>
+            <a:endParaRPr kumimoji="1" lang="ja-JP" altLang="en-US"/>
+          </a:p>
+        </p:txBody>
+      </p:sp>
+      <p:sp>
+        <p:nvSpPr>
+          <p:cNvPr id="7" name="正方形/長方形 6">
+            <a:extLst>
+              <a:ext uri="{FF2B5EF4-FFF2-40B4-BE49-F238E27FC236}">
+                <a16:creationId xmlns:a16="http://schemas.microsoft.com/office/drawing/2014/main" id="{A3B0A41B-DDF3-A52F-81E0-611C9BA80330}"/>
+              </a:ext>
+            </a:extLst>
+          </p:cNvPr>
+          <p:cNvSpPr/>
+          <p:nvPr/>
+        </p:nvSpPr>
+        <p:spPr>
+          <a:xfrm>
+            <a:off x="905189" y="2274435"/>
+            <a:ext cx="277586" cy="277586"/>
+          </a:xfrm>
+          <a:prstGeom prst="rect">
+            <a:avLst/>
+          </a:prstGeom>
+        </p:spPr>
+        <p:style>
+          <a:lnRef idx="2">
+            <a:schemeClr val="accent1">
+              <a:shade val="50000"/>
+            </a:schemeClr>
+          </a:lnRef>
+          <a:fillRef idx="1">
+            <a:schemeClr val="accent1"/>
+          </a:fillRef>
+          <a:effectRef idx="0">
+            <a:schemeClr val="accent1"/>
+          </a:effectRef>
+          <a:fontRef idx="minor">
+            <a:schemeClr val="lt1"/>
+          </a:fontRef>
+        </p:style>
+        <p:txBody>
+          <a:bodyPr rtlCol="0" anchor="ctr"/>
+          <a:lstStyle/>
+          <a:p>
+            <a:pPr algn="ctr"/>
+            <a:r>
+              <a:rPr kumimoji="1" lang="en-US" altLang="ja-JP" dirty="0">
+                <a:latin typeface="HGPSoeiKakugothicUB" panose="020B0900000000000000" pitchFamily="34" charset="-128"/>
+                <a:ea typeface="HGPSoeiKakugothicUB" panose="020B0900000000000000" pitchFamily="34" charset="-128"/>
+              </a:rPr>
+              <a:t>1</a:t>
+            </a:r>
+            <a:endParaRPr kumimoji="1" lang="ja-JP" altLang="en-US">
+              <a:latin typeface="HGPSoeiKakugothicUB" panose="020B0900000000000000" pitchFamily="34" charset="-128"/>
+              <a:ea typeface="HGPSoeiKakugothicUB" panose="020B0900000000000000" pitchFamily="34" charset="-128"/>
+            </a:endParaRPr>
+          </a:p>
+        </p:txBody>
+      </p:sp>
+      <p:sp>
+        <p:nvSpPr>
+          <p:cNvPr id="8" name="テキスト ボックス 7">
+            <a:extLst>
+              <a:ext uri="{FF2B5EF4-FFF2-40B4-BE49-F238E27FC236}">
+                <a16:creationId xmlns:a16="http://schemas.microsoft.com/office/drawing/2014/main" id="{ED5DB2B3-FD89-D9B3-253D-01832AC73B5E}"/>
+              </a:ext>
+            </a:extLst>
+          </p:cNvPr>
+          <p:cNvSpPr txBox="1"/>
+          <p:nvPr/>
+        </p:nvSpPr>
+        <p:spPr>
+          <a:xfrm>
+            <a:off x="1220455" y="2263038"/>
+            <a:ext cx="1168539" cy="646331"/>
+          </a:xfrm>
+          <a:prstGeom prst="rect">
+            <a:avLst/>
+          </a:prstGeom>
+          <a:noFill/>
+        </p:spPr>
+        <p:txBody>
+          <a:bodyPr wrap="square" rtlCol="0">
+            <a:spAutoFit/>
+          </a:bodyPr>
+          <a:lstStyle/>
+          <a:p>
+            <a:r>
+              <a:rPr lang="ja-JP" altLang="en-US">
+                <a:latin typeface="HGSSoeiKakugothicUB" panose="020B0900000000000000" pitchFamily="34" charset="-128"/>
+                <a:ea typeface="HGSSoeiKakugothicUB" panose="020B0900000000000000" pitchFamily="34" charset="-128"/>
+              </a:rPr>
+              <a:t>現行バーション</a:t>
+            </a:r>
+            <a:endParaRPr kumimoji="1" lang="ja-JP" altLang="en-US">
+              <a:latin typeface="HGSSoeiKakugothicUB" panose="020B0900000000000000" pitchFamily="34" charset="-128"/>
+              <a:ea typeface="HGSSoeiKakugothicUB" panose="020B0900000000000000" pitchFamily="34" charset="-128"/>
+            </a:endParaRPr>
+          </a:p>
+        </p:txBody>
+      </p:sp>
+      <p:sp>
+        <p:nvSpPr>
+          <p:cNvPr id="9" name="円/楕円 8">
+            <a:extLst>
+              <a:ext uri="{FF2B5EF4-FFF2-40B4-BE49-F238E27FC236}">
+                <a16:creationId xmlns:a16="http://schemas.microsoft.com/office/drawing/2014/main" id="{93FEEF5F-29FD-23CE-E211-55276DB2FBAC}"/>
+              </a:ext>
+            </a:extLst>
+          </p:cNvPr>
+          <p:cNvSpPr/>
+          <p:nvPr/>
+        </p:nvSpPr>
+        <p:spPr>
+          <a:xfrm rot="904551">
+            <a:off x="3238501" y="2955891"/>
+            <a:ext cx="326571" cy="326571"/>
+          </a:xfrm>
+          <a:prstGeom prst="ellipse">
+            <a:avLst/>
+          </a:prstGeom>
+          <a:solidFill>
+            <a:schemeClr val="accent4"/>
+          </a:solidFill>
+          <a:ln>
+            <a:solidFill>
+              <a:schemeClr val="tx1"/>
+            </a:solidFill>
+          </a:ln>
+        </p:spPr>
+        <p:style>
+          <a:lnRef idx="2">
+            <a:schemeClr val="accent1">
+              <a:shade val="50000"/>
+            </a:schemeClr>
+          </a:lnRef>
+          <a:fillRef idx="1">
+            <a:schemeClr val="accent1"/>
+          </a:fillRef>
+          <a:effectRef idx="0">
+            <a:schemeClr val="accent1"/>
+          </a:effectRef>
+          <a:fontRef idx="minor">
+            <a:schemeClr val="lt1"/>
+          </a:fontRef>
+        </p:style>
+        <p:txBody>
+          <a:bodyPr rtlCol="0" anchor="ctr"/>
+          <a:lstStyle/>
+          <a:p>
+            <a:pPr algn="ctr"/>
+            <a:endParaRPr kumimoji="1" lang="ja-JP" altLang="en-US"/>
+          </a:p>
+        </p:txBody>
+      </p:sp>
+      <p:sp>
+        <p:nvSpPr>
+          <p:cNvPr id="10" name="正方形/長方形 9">
+            <a:extLst>
+              <a:ext uri="{FF2B5EF4-FFF2-40B4-BE49-F238E27FC236}">
+                <a16:creationId xmlns:a16="http://schemas.microsoft.com/office/drawing/2014/main" id="{BF616245-9DAE-E692-F6A9-4B547A293C25}"/>
+              </a:ext>
+            </a:extLst>
+          </p:cNvPr>
+          <p:cNvSpPr/>
+          <p:nvPr/>
+        </p:nvSpPr>
+        <p:spPr>
+          <a:xfrm>
+            <a:off x="2628900" y="2254237"/>
+            <a:ext cx="277586" cy="277586"/>
+          </a:xfrm>
+          <a:prstGeom prst="rect">
+            <a:avLst/>
+          </a:prstGeom>
+        </p:spPr>
+        <p:style>
+          <a:lnRef idx="2">
+            <a:schemeClr val="accent1">
+              <a:shade val="50000"/>
+            </a:schemeClr>
+          </a:lnRef>
+          <a:fillRef idx="1">
+            <a:schemeClr val="accent1"/>
+          </a:fillRef>
+          <a:effectRef idx="0">
+            <a:schemeClr val="accent1"/>
+          </a:effectRef>
+          <a:fontRef idx="minor">
+            <a:schemeClr val="lt1"/>
+          </a:fontRef>
+        </p:style>
+        <p:txBody>
+          <a:bodyPr rtlCol="0" anchor="ctr"/>
+          <a:lstStyle/>
+          <a:p>
+            <a:pPr algn="ctr"/>
+            <a:r>
+              <a:rPr lang="ja-JP" altLang="en-US" dirty="0">
+                <a:latin typeface="HGPSoeiKakugothicUB" panose="020B0900000000000000" pitchFamily="34" charset="-128"/>
+                <a:ea typeface="HGPSoeiKakugothicUB" panose="020B0900000000000000" pitchFamily="34" charset="-128"/>
+              </a:rPr>
+              <a:t>２</a:t>
+            </a:r>
+            <a:endParaRPr kumimoji="1" lang="ja-JP" altLang="en-US">
+              <a:latin typeface="HGPSoeiKakugothicUB" panose="020B0900000000000000" pitchFamily="34" charset="-128"/>
+              <a:ea typeface="HGPSoeiKakugothicUB" panose="020B0900000000000000" pitchFamily="34" charset="-128"/>
+            </a:endParaRPr>
+          </a:p>
+        </p:txBody>
+      </p:sp>
+      <p:sp>
+        <p:nvSpPr>
+          <p:cNvPr id="11" name="テキスト ボックス 10">
+            <a:extLst>
+              <a:ext uri="{FF2B5EF4-FFF2-40B4-BE49-F238E27FC236}">
+                <a16:creationId xmlns:a16="http://schemas.microsoft.com/office/drawing/2014/main" id="{801330E0-FF16-90B2-C7F2-C2730A40842B}"/>
+              </a:ext>
+            </a:extLst>
+          </p:cNvPr>
+          <p:cNvSpPr txBox="1"/>
+          <p:nvPr/>
+        </p:nvSpPr>
+        <p:spPr>
+          <a:xfrm>
+            <a:off x="2924275" y="2208657"/>
+            <a:ext cx="1763485" cy="646331"/>
+          </a:xfrm>
+          <a:prstGeom prst="rect">
+            <a:avLst/>
+          </a:prstGeom>
+          <a:noFill/>
+        </p:spPr>
+        <p:txBody>
+          <a:bodyPr wrap="square" rtlCol="0">
+            <a:spAutoFit/>
+          </a:bodyPr>
+          <a:lstStyle/>
+          <a:p>
+            <a:r>
+              <a:rPr lang="ja-JP" altLang="en-US">
+                <a:latin typeface="HGSSoeiKakugothicUB" panose="020B0900000000000000" pitchFamily="34" charset="-128"/>
+                <a:ea typeface="HGSSoeiKakugothicUB" panose="020B0900000000000000" pitchFamily="34" charset="-128"/>
+              </a:rPr>
+              <a:t>新しいバーション</a:t>
+            </a:r>
+            <a:endParaRPr kumimoji="1" lang="ja-JP" altLang="en-US">
+              <a:latin typeface="HGSSoeiKakugothicUB" panose="020B0900000000000000" pitchFamily="34" charset="-128"/>
+              <a:ea typeface="HGSSoeiKakugothicUB" panose="020B0900000000000000" pitchFamily="34" charset="-128"/>
+            </a:endParaRPr>
+          </a:p>
+        </p:txBody>
+      </p:sp>
+      <p:sp>
+        <p:nvSpPr>
+          <p:cNvPr id="12" name="円/楕円 11">
+            <a:extLst>
+              <a:ext uri="{FF2B5EF4-FFF2-40B4-BE49-F238E27FC236}">
+                <a16:creationId xmlns:a16="http://schemas.microsoft.com/office/drawing/2014/main" id="{341C721F-0A21-FF87-8478-1302555A20F5}"/>
+              </a:ext>
+            </a:extLst>
+          </p:cNvPr>
+          <p:cNvSpPr/>
+          <p:nvPr/>
+        </p:nvSpPr>
+        <p:spPr>
+          <a:xfrm rot="19847820">
+            <a:off x="964103" y="5070118"/>
+            <a:ext cx="326571" cy="326571"/>
+          </a:xfrm>
+          <a:prstGeom prst="ellipse">
+            <a:avLst/>
+          </a:prstGeom>
+          <a:solidFill>
+            <a:schemeClr val="accent6"/>
+          </a:solidFill>
+          <a:ln>
+            <a:solidFill>
+              <a:schemeClr val="tx1"/>
+            </a:solidFill>
+          </a:ln>
+        </p:spPr>
+        <p:style>
+          <a:lnRef idx="2">
+            <a:schemeClr val="accent1">
+              <a:shade val="50000"/>
+            </a:schemeClr>
+          </a:lnRef>
+          <a:fillRef idx="1">
+            <a:schemeClr val="accent1"/>
+          </a:fillRef>
+          <a:effectRef idx="0">
+            <a:schemeClr val="accent1"/>
+          </a:effectRef>
+          <a:fontRef idx="minor">
+            <a:schemeClr val="lt1"/>
+          </a:fontRef>
+        </p:style>
+        <p:txBody>
+          <a:bodyPr rtlCol="0" anchor="ctr"/>
+          <a:lstStyle/>
+          <a:p>
+            <a:pPr algn="ctr"/>
+            <a:endParaRPr kumimoji="1" lang="ja-JP" altLang="en-US"/>
+          </a:p>
+        </p:txBody>
+      </p:sp>
+      <p:sp>
+        <p:nvSpPr>
+          <p:cNvPr id="17" name="円/楕円 16">
+            <a:extLst>
+              <a:ext uri="{FF2B5EF4-FFF2-40B4-BE49-F238E27FC236}">
+                <a16:creationId xmlns:a16="http://schemas.microsoft.com/office/drawing/2014/main" id="{DC3D3936-25FC-22B9-8231-C7F23FB742E4}"/>
+              </a:ext>
+            </a:extLst>
+          </p:cNvPr>
+          <p:cNvSpPr/>
+          <p:nvPr/>
+        </p:nvSpPr>
+        <p:spPr>
+          <a:xfrm rot="904551">
+            <a:off x="5279572" y="2952117"/>
+            <a:ext cx="326571" cy="326571"/>
+          </a:xfrm>
+          <a:prstGeom prst="ellipse">
+            <a:avLst/>
+          </a:prstGeom>
+          <a:solidFill>
+            <a:schemeClr val="accent4"/>
+          </a:solidFill>
+          <a:ln>
+            <a:solidFill>
+              <a:schemeClr val="tx1"/>
+            </a:solidFill>
+          </a:ln>
+        </p:spPr>
+        <p:style>
+          <a:lnRef idx="2">
+            <a:schemeClr val="accent1">
+              <a:shade val="50000"/>
+            </a:schemeClr>
+          </a:lnRef>
+          <a:fillRef idx="1">
+            <a:schemeClr val="accent1"/>
+          </a:fillRef>
+          <a:effectRef idx="0">
+            <a:schemeClr val="accent1"/>
+          </a:effectRef>
+          <a:fontRef idx="minor">
+            <a:schemeClr val="lt1"/>
+          </a:fontRef>
+        </p:style>
+        <p:txBody>
+          <a:bodyPr rtlCol="0" anchor="ctr"/>
+          <a:lstStyle/>
+          <a:p>
+            <a:pPr algn="ctr"/>
+            <a:endParaRPr kumimoji="1" lang="ja-JP" altLang="en-US"/>
+          </a:p>
+        </p:txBody>
+      </p:sp>
+      <p:sp>
+        <p:nvSpPr>
+          <p:cNvPr id="18" name="正方形/長方形 17">
+            <a:extLst>
+              <a:ext uri="{FF2B5EF4-FFF2-40B4-BE49-F238E27FC236}">
+                <a16:creationId xmlns:a16="http://schemas.microsoft.com/office/drawing/2014/main" id="{D78B5712-1E64-6EEF-F1BB-CB9FDF76135B}"/>
+              </a:ext>
+            </a:extLst>
+          </p:cNvPr>
+          <p:cNvSpPr/>
+          <p:nvPr/>
+        </p:nvSpPr>
+        <p:spPr>
+          <a:xfrm>
+            <a:off x="4917621" y="2274435"/>
+            <a:ext cx="277586" cy="277586"/>
+          </a:xfrm>
+          <a:prstGeom prst="rect">
+            <a:avLst/>
+          </a:prstGeom>
+        </p:spPr>
+        <p:style>
+          <a:lnRef idx="2">
+            <a:schemeClr val="accent1">
+              <a:shade val="50000"/>
+            </a:schemeClr>
+          </a:lnRef>
+          <a:fillRef idx="1">
+            <a:schemeClr val="accent1"/>
+          </a:fillRef>
+          <a:effectRef idx="0">
+            <a:schemeClr val="accent1"/>
+          </a:effectRef>
+          <a:fontRef idx="minor">
+            <a:schemeClr val="lt1"/>
+          </a:fontRef>
+        </p:style>
+        <p:txBody>
+          <a:bodyPr rtlCol="0" anchor="ctr"/>
+          <a:lstStyle/>
+          <a:p>
+            <a:pPr algn="ctr"/>
+            <a:r>
+              <a:rPr kumimoji="1" lang="ja-JP" altLang="en-US" dirty="0">
+                <a:latin typeface="HGPSoeiKakugothicUB" panose="020B0900000000000000" pitchFamily="34" charset="-128"/>
+                <a:ea typeface="HGPSoeiKakugothicUB" panose="020B0900000000000000" pitchFamily="34" charset="-128"/>
+              </a:rPr>
+              <a:t>３</a:t>
+            </a:r>
+            <a:endParaRPr kumimoji="1" lang="ja-JP" altLang="en-US">
+              <a:latin typeface="HGPSoeiKakugothicUB" panose="020B0900000000000000" pitchFamily="34" charset="-128"/>
+              <a:ea typeface="HGPSoeiKakugothicUB" panose="020B0900000000000000" pitchFamily="34" charset="-128"/>
+            </a:endParaRPr>
+          </a:p>
+        </p:txBody>
+      </p:sp>
+      <p:sp>
+        <p:nvSpPr>
+          <p:cNvPr id="19" name="テキスト ボックス 18">
+            <a:extLst>
+              <a:ext uri="{FF2B5EF4-FFF2-40B4-BE49-F238E27FC236}">
+                <a16:creationId xmlns:a16="http://schemas.microsoft.com/office/drawing/2014/main" id="{4B7FD073-68CA-F67D-E24E-500564E40825}"/>
+              </a:ext>
+            </a:extLst>
+          </p:cNvPr>
+          <p:cNvSpPr txBox="1"/>
+          <p:nvPr/>
+        </p:nvSpPr>
+        <p:spPr>
+          <a:xfrm>
+            <a:off x="5167572" y="2208364"/>
+            <a:ext cx="1763485" cy="369332"/>
+          </a:xfrm>
+          <a:prstGeom prst="rect">
+            <a:avLst/>
+          </a:prstGeom>
+          <a:noFill/>
+        </p:spPr>
+        <p:txBody>
+          <a:bodyPr wrap="square" rtlCol="0">
+            <a:spAutoFit/>
+          </a:bodyPr>
+          <a:lstStyle/>
+          <a:p>
+            <a:r>
+              <a:rPr lang="ja-JP" altLang="en-US">
+                <a:latin typeface="HGSSoeiKakugothicUB" panose="020B0900000000000000" pitchFamily="34" charset="-128"/>
+                <a:ea typeface="HGSSoeiKakugothicUB" panose="020B0900000000000000" pitchFamily="34" charset="-128"/>
+              </a:rPr>
+              <a:t>個別に作業</a:t>
+            </a:r>
+            <a:endParaRPr kumimoji="1" lang="ja-JP" altLang="en-US">
+              <a:latin typeface="HGSSoeiKakugothicUB" panose="020B0900000000000000" pitchFamily="34" charset="-128"/>
+              <a:ea typeface="HGSSoeiKakugothicUB" panose="020B0900000000000000" pitchFamily="34" charset="-128"/>
+            </a:endParaRPr>
+          </a:p>
+        </p:txBody>
+      </p:sp>
+      <p:sp>
+        <p:nvSpPr>
+          <p:cNvPr id="20" name="円/楕円 19">
+            <a:extLst>
+              <a:ext uri="{FF2B5EF4-FFF2-40B4-BE49-F238E27FC236}">
+                <a16:creationId xmlns:a16="http://schemas.microsoft.com/office/drawing/2014/main" id="{F5F291F6-EB02-6311-349B-65C518A2C6B6}"/>
+              </a:ext>
+            </a:extLst>
+          </p:cNvPr>
+          <p:cNvSpPr/>
+          <p:nvPr/>
+        </p:nvSpPr>
+        <p:spPr>
+          <a:xfrm rot="19847820">
+            <a:off x="5829299" y="3881170"/>
+            <a:ext cx="326571" cy="326571"/>
+          </a:xfrm>
+          <a:prstGeom prst="ellipse">
+            <a:avLst/>
+          </a:prstGeom>
+          <a:solidFill>
+            <a:schemeClr val="accent6"/>
+          </a:solidFill>
+          <a:ln>
+            <a:solidFill>
+              <a:schemeClr val="tx1"/>
+            </a:solidFill>
+          </a:ln>
+        </p:spPr>
+        <p:style>
+          <a:lnRef idx="2">
+            <a:schemeClr val="accent1">
+              <a:shade val="50000"/>
+            </a:schemeClr>
+          </a:lnRef>
+          <a:fillRef idx="1">
+            <a:schemeClr val="accent1"/>
+          </a:fillRef>
+          <a:effectRef idx="0">
+            <a:schemeClr val="accent1"/>
+          </a:effectRef>
+          <a:fontRef idx="minor">
+            <a:schemeClr val="lt1"/>
+          </a:fontRef>
+        </p:style>
+        <p:txBody>
+          <a:bodyPr rtlCol="0" anchor="ctr"/>
+          <a:lstStyle/>
+          <a:p>
+            <a:pPr algn="ctr"/>
+            <a:endParaRPr kumimoji="1" lang="ja-JP" altLang="en-US"/>
+          </a:p>
+        </p:txBody>
+      </p:sp>
+      <p:cxnSp>
+        <p:nvCxnSpPr>
+          <p:cNvPr id="21" name="直線コネクタ 20">
+            <a:extLst>
+              <a:ext uri="{FF2B5EF4-FFF2-40B4-BE49-F238E27FC236}">
+                <a16:creationId xmlns:a16="http://schemas.microsoft.com/office/drawing/2014/main" id="{99FA6E9D-9342-E86E-77EC-3BEF88F08525}"/>
+              </a:ext>
+            </a:extLst>
+          </p:cNvPr>
+          <p:cNvCxnSpPr>
+            <a:stCxn id="17" idx="5"/>
+            <a:endCxn id="20" idx="0"/>
+          </p:cNvCxnSpPr>
+          <p:nvPr/>
+        </p:nvCxnSpPr>
+        <p:spPr>
+          <a:xfrm>
+            <a:off x="5524313" y="3256920"/>
+            <a:ext cx="388604" cy="645004"/>
+          </a:xfrm>
+          <a:prstGeom prst="line">
+            <a:avLst/>
+          </a:prstGeom>
+          <a:ln w="12700">
+            <a:solidFill>
+              <a:schemeClr val="tx1"/>
+            </a:solidFill>
+          </a:ln>
+        </p:spPr>
+        <p:style>
+          <a:lnRef idx="1">
+            <a:schemeClr val="accent1"/>
+          </a:lnRef>
+          <a:fillRef idx="0">
+            <a:schemeClr val="accent1"/>
+          </a:fillRef>
+          <a:effectRef idx="0">
+            <a:schemeClr val="accent1"/>
+          </a:effectRef>
+          <a:fontRef idx="minor">
+            <a:schemeClr val="tx1"/>
+          </a:fontRef>
+        </p:style>
+      </p:cxnSp>
+      <p:sp>
+        <p:nvSpPr>
+          <p:cNvPr id="22" name="円/楕円 21">
+            <a:extLst>
+              <a:ext uri="{FF2B5EF4-FFF2-40B4-BE49-F238E27FC236}">
+                <a16:creationId xmlns:a16="http://schemas.microsoft.com/office/drawing/2014/main" id="{F9B755E0-103A-53E7-E828-BAF2D294E7DF}"/>
+              </a:ext>
+            </a:extLst>
+          </p:cNvPr>
+          <p:cNvSpPr/>
+          <p:nvPr/>
+        </p:nvSpPr>
+        <p:spPr>
+          <a:xfrm rot="185650">
+            <a:off x="6385723" y="2947096"/>
+            <a:ext cx="326571" cy="326571"/>
+          </a:xfrm>
+          <a:prstGeom prst="ellipse">
+            <a:avLst/>
+          </a:prstGeom>
+          <a:solidFill>
+            <a:schemeClr val="accent4"/>
+          </a:solidFill>
+          <a:ln>
+            <a:solidFill>
+              <a:schemeClr val="tx1"/>
+            </a:solidFill>
+          </a:ln>
+        </p:spPr>
+        <p:style>
+          <a:lnRef idx="2">
+            <a:schemeClr val="accent1">
+              <a:shade val="50000"/>
+            </a:schemeClr>
+          </a:lnRef>
+          <a:fillRef idx="1">
+            <a:schemeClr val="accent1"/>
+          </a:fillRef>
+          <a:effectRef idx="0">
+            <a:schemeClr val="accent1"/>
+          </a:effectRef>
+          <a:fontRef idx="minor">
+            <a:schemeClr val="lt1"/>
+          </a:fontRef>
+        </p:style>
+        <p:txBody>
+          <a:bodyPr rtlCol="0" anchor="ctr"/>
+          <a:lstStyle/>
+          <a:p>
+            <a:pPr algn="ctr"/>
+            <a:endParaRPr kumimoji="1" lang="ja-JP" altLang="en-US"/>
+          </a:p>
+        </p:txBody>
+      </p:sp>
+      <p:cxnSp>
+        <p:nvCxnSpPr>
+          <p:cNvPr id="23" name="直線コネクタ 22">
+            <a:extLst>
+              <a:ext uri="{FF2B5EF4-FFF2-40B4-BE49-F238E27FC236}">
+                <a16:creationId xmlns:a16="http://schemas.microsoft.com/office/drawing/2014/main" id="{6384FB65-7D56-F4E5-BAB3-76305309726C}"/>
+              </a:ext>
+            </a:extLst>
+          </p:cNvPr>
+          <p:cNvCxnSpPr>
+            <a:cxnSpLocks/>
+            <a:endCxn id="22" idx="2"/>
+          </p:cNvCxnSpPr>
+          <p:nvPr/>
+        </p:nvCxnSpPr>
+        <p:spPr>
+          <a:xfrm flipV="1">
+            <a:off x="5607329" y="3101568"/>
+            <a:ext cx="778632" cy="1395"/>
+          </a:xfrm>
+          <a:prstGeom prst="line">
+            <a:avLst/>
+          </a:prstGeom>
+          <a:ln w="12700">
+            <a:solidFill>
+              <a:schemeClr val="tx1"/>
+            </a:solidFill>
+          </a:ln>
+        </p:spPr>
+        <p:style>
+          <a:lnRef idx="1">
+            <a:schemeClr val="accent1"/>
+          </a:lnRef>
+          <a:fillRef idx="0">
+            <a:schemeClr val="accent1"/>
+          </a:fillRef>
+          <a:effectRef idx="0">
+            <a:schemeClr val="accent1"/>
+          </a:effectRef>
+          <a:fontRef idx="minor">
+            <a:schemeClr val="tx1"/>
+          </a:fontRef>
+        </p:style>
+      </p:cxnSp>
+      <p:sp>
+        <p:nvSpPr>
+          <p:cNvPr id="35" name="円/楕円 34">
+            <a:extLst>
+              <a:ext uri="{FF2B5EF4-FFF2-40B4-BE49-F238E27FC236}">
+                <a16:creationId xmlns:a16="http://schemas.microsoft.com/office/drawing/2014/main" id="{B256DF25-5350-8607-F300-18D3B2D157FC}"/>
+              </a:ext>
+            </a:extLst>
+          </p:cNvPr>
+          <p:cNvSpPr/>
+          <p:nvPr/>
+        </p:nvSpPr>
+        <p:spPr>
+          <a:xfrm rot="19847820">
+            <a:off x="6931981" y="3881168"/>
+            <a:ext cx="326571" cy="326571"/>
+          </a:xfrm>
+          <a:prstGeom prst="ellipse">
+            <a:avLst/>
+          </a:prstGeom>
+          <a:solidFill>
+            <a:schemeClr val="accent6"/>
+          </a:solidFill>
+          <a:ln>
+            <a:solidFill>
+              <a:schemeClr val="tx1"/>
+            </a:solidFill>
+          </a:ln>
+        </p:spPr>
+        <p:style>
+          <a:lnRef idx="2">
+            <a:schemeClr val="accent1">
+              <a:shade val="50000"/>
+            </a:schemeClr>
+          </a:lnRef>
+          <a:fillRef idx="1">
+            <a:schemeClr val="accent1"/>
+          </a:fillRef>
+          <a:effectRef idx="0">
+            <a:schemeClr val="accent1"/>
+          </a:effectRef>
+          <a:fontRef idx="minor">
+            <a:schemeClr val="lt1"/>
+          </a:fontRef>
+        </p:style>
+        <p:txBody>
+          <a:bodyPr rtlCol="0" anchor="ctr"/>
+          <a:lstStyle/>
+          <a:p>
+            <a:pPr algn="ctr"/>
+            <a:endParaRPr kumimoji="1" lang="ja-JP" altLang="en-US"/>
+          </a:p>
+        </p:txBody>
+      </p:sp>
+      <p:cxnSp>
+        <p:nvCxnSpPr>
+          <p:cNvPr id="36" name="直線コネクタ 35">
+            <a:extLst>
+              <a:ext uri="{FF2B5EF4-FFF2-40B4-BE49-F238E27FC236}">
+                <a16:creationId xmlns:a16="http://schemas.microsoft.com/office/drawing/2014/main" id="{163D455A-5E8E-DB07-ECA5-923891BE5912}"/>
+              </a:ext>
+            </a:extLst>
+          </p:cNvPr>
+          <p:cNvCxnSpPr>
+            <a:cxnSpLocks/>
+          </p:cNvCxnSpPr>
+          <p:nvPr/>
+        </p:nvCxnSpPr>
+        <p:spPr>
+          <a:xfrm flipV="1">
+            <a:off x="6154609" y="4037306"/>
+            <a:ext cx="778632" cy="1395"/>
+          </a:xfrm>
+          <a:prstGeom prst="line">
+            <a:avLst/>
+          </a:prstGeom>
+          <a:ln w="12700">
+            <a:solidFill>
+              <a:schemeClr val="tx1"/>
+            </a:solidFill>
+          </a:ln>
+        </p:spPr>
+        <p:style>
+          <a:lnRef idx="1">
+            <a:schemeClr val="accent1"/>
+          </a:lnRef>
+          <a:fillRef idx="0">
+            <a:schemeClr val="accent1"/>
+          </a:fillRef>
+          <a:effectRef idx="0">
+            <a:schemeClr val="accent1"/>
+          </a:effectRef>
+          <a:fontRef idx="minor">
+            <a:schemeClr val="tx1"/>
+          </a:fontRef>
+        </p:style>
+      </p:cxnSp>
+      <p:sp>
+        <p:nvSpPr>
+          <p:cNvPr id="37" name="円/楕円 36">
+            <a:extLst>
+              <a:ext uri="{FF2B5EF4-FFF2-40B4-BE49-F238E27FC236}">
+                <a16:creationId xmlns:a16="http://schemas.microsoft.com/office/drawing/2014/main" id="{F94D41DE-DD85-E0CB-3AC5-8C2E0465FF86}"/>
+              </a:ext>
+            </a:extLst>
+          </p:cNvPr>
+          <p:cNvSpPr/>
+          <p:nvPr/>
+        </p:nvSpPr>
+        <p:spPr>
+          <a:xfrm rot="904551">
+            <a:off x="7878314" y="2986300"/>
+            <a:ext cx="326571" cy="326571"/>
+          </a:xfrm>
+          <a:prstGeom prst="ellipse">
+            <a:avLst/>
+          </a:prstGeom>
+          <a:solidFill>
+            <a:schemeClr val="accent4"/>
+          </a:solidFill>
+          <a:ln>
+            <a:solidFill>
+              <a:schemeClr val="tx1"/>
+            </a:solidFill>
+          </a:ln>
+        </p:spPr>
+        <p:style>
+          <a:lnRef idx="2">
+            <a:schemeClr val="accent1">
+              <a:shade val="50000"/>
+            </a:schemeClr>
+          </a:lnRef>
+          <a:fillRef idx="1">
+            <a:schemeClr val="accent1"/>
+          </a:fillRef>
+          <a:effectRef idx="0">
+            <a:schemeClr val="accent1"/>
+          </a:effectRef>
+          <a:fontRef idx="minor">
+            <a:schemeClr val="lt1"/>
+          </a:fontRef>
+        </p:style>
+        <p:txBody>
+          <a:bodyPr rtlCol="0" anchor="ctr"/>
+          <a:lstStyle/>
+          <a:p>
+            <a:pPr algn="ctr"/>
+            <a:endParaRPr kumimoji="1" lang="ja-JP" altLang="en-US"/>
+          </a:p>
+        </p:txBody>
+      </p:sp>
+      <p:sp>
+        <p:nvSpPr>
+          <p:cNvPr id="38" name="正方形/長方形 37">
+            <a:extLst>
+              <a:ext uri="{FF2B5EF4-FFF2-40B4-BE49-F238E27FC236}">
+                <a16:creationId xmlns:a16="http://schemas.microsoft.com/office/drawing/2014/main" id="{29AE5623-9BB9-AB4C-EA18-E4A9327758D3}"/>
+              </a:ext>
+            </a:extLst>
+          </p:cNvPr>
+          <p:cNvSpPr/>
+          <p:nvPr/>
+        </p:nvSpPr>
+        <p:spPr>
+          <a:xfrm>
+            <a:off x="7504242" y="2274435"/>
+            <a:ext cx="277586" cy="277586"/>
+          </a:xfrm>
+          <a:prstGeom prst="rect">
+            <a:avLst/>
+          </a:prstGeom>
+        </p:spPr>
+        <p:style>
+          <a:lnRef idx="2">
+            <a:schemeClr val="accent1">
+              <a:shade val="50000"/>
+            </a:schemeClr>
+          </a:lnRef>
+          <a:fillRef idx="1">
+            <a:schemeClr val="accent1"/>
+          </a:fillRef>
+          <a:effectRef idx="0">
+            <a:schemeClr val="accent1"/>
+          </a:effectRef>
+          <a:fontRef idx="minor">
+            <a:schemeClr val="lt1"/>
+          </a:fontRef>
+        </p:style>
+        <p:txBody>
+          <a:bodyPr rtlCol="0" anchor="ctr"/>
+          <a:lstStyle/>
+          <a:p>
+            <a:pPr algn="ctr"/>
+            <a:r>
+              <a:rPr lang="ja-JP" altLang="en-US" dirty="0">
+                <a:latin typeface="HGPSoeiKakugothicUB" panose="020B0900000000000000" pitchFamily="34" charset="-128"/>
+                <a:ea typeface="HGPSoeiKakugothicUB" panose="020B0900000000000000" pitchFamily="34" charset="-128"/>
+              </a:rPr>
+              <a:t>４</a:t>
+            </a:r>
+            <a:endParaRPr kumimoji="1" lang="ja-JP" altLang="en-US">
+              <a:latin typeface="HGPSoeiKakugothicUB" panose="020B0900000000000000" pitchFamily="34" charset="-128"/>
+              <a:ea typeface="HGPSoeiKakugothicUB" panose="020B0900000000000000" pitchFamily="34" charset="-128"/>
+            </a:endParaRPr>
+          </a:p>
+        </p:txBody>
+      </p:sp>
+      <p:sp>
+        <p:nvSpPr>
+          <p:cNvPr id="39" name="テキスト ボックス 38">
+            <a:extLst>
+              <a:ext uri="{FF2B5EF4-FFF2-40B4-BE49-F238E27FC236}">
+                <a16:creationId xmlns:a16="http://schemas.microsoft.com/office/drawing/2014/main" id="{6CF38A46-AFE9-4021-DFE1-09B3C6BD9043}"/>
+              </a:ext>
+            </a:extLst>
+          </p:cNvPr>
+          <p:cNvSpPr txBox="1"/>
+          <p:nvPr/>
+        </p:nvSpPr>
+        <p:spPr>
+          <a:xfrm>
+            <a:off x="7841463" y="2208364"/>
+            <a:ext cx="1763485" cy="646331"/>
+          </a:xfrm>
+          <a:prstGeom prst="rect">
+            <a:avLst/>
+          </a:prstGeom>
+          <a:noFill/>
+        </p:spPr>
+        <p:txBody>
+          <a:bodyPr wrap="square" rtlCol="0">
+            <a:spAutoFit/>
+          </a:bodyPr>
+          <a:lstStyle/>
+          <a:p>
+            <a:r>
+              <a:rPr lang="ja-JP" altLang="en-US">
+                <a:latin typeface="HGSSoeiKakugothicUB" panose="020B0900000000000000" pitchFamily="34" charset="-128"/>
+                <a:ea typeface="HGSSoeiKakugothicUB" panose="020B0900000000000000" pitchFamily="34" charset="-128"/>
+              </a:rPr>
+              <a:t>作業をマージする</a:t>
+            </a:r>
+            <a:endParaRPr kumimoji="1" lang="ja-JP" altLang="en-US">
+              <a:latin typeface="HGSSoeiKakugothicUB" panose="020B0900000000000000" pitchFamily="34" charset="-128"/>
+              <a:ea typeface="HGSSoeiKakugothicUB" panose="020B0900000000000000" pitchFamily="34" charset="-128"/>
+            </a:endParaRPr>
+          </a:p>
+        </p:txBody>
+      </p:sp>
+      <p:sp>
+        <p:nvSpPr>
+          <p:cNvPr id="40" name="円/楕円 39">
+            <a:extLst>
+              <a:ext uri="{FF2B5EF4-FFF2-40B4-BE49-F238E27FC236}">
+                <a16:creationId xmlns:a16="http://schemas.microsoft.com/office/drawing/2014/main" id="{3813EE6C-9CAC-5174-673A-B3CF56B0A3B6}"/>
+              </a:ext>
+            </a:extLst>
+          </p:cNvPr>
+          <p:cNvSpPr/>
+          <p:nvPr/>
+        </p:nvSpPr>
+        <p:spPr>
+          <a:xfrm rot="19847820">
+            <a:off x="8428041" y="3915353"/>
+            <a:ext cx="326571" cy="326571"/>
+          </a:xfrm>
+          <a:prstGeom prst="ellipse">
+            <a:avLst/>
+          </a:prstGeom>
+          <a:solidFill>
+            <a:schemeClr val="accent6"/>
+          </a:solidFill>
+          <a:ln>
+            <a:solidFill>
+              <a:schemeClr val="tx1"/>
+            </a:solidFill>
+          </a:ln>
+        </p:spPr>
+        <p:style>
+          <a:lnRef idx="2">
+            <a:schemeClr val="accent1">
+              <a:shade val="50000"/>
+            </a:schemeClr>
+          </a:lnRef>
+          <a:fillRef idx="1">
+            <a:schemeClr val="accent1"/>
+          </a:fillRef>
+          <a:effectRef idx="0">
+            <a:schemeClr val="accent1"/>
+          </a:effectRef>
+          <a:fontRef idx="minor">
+            <a:schemeClr val="lt1"/>
+          </a:fontRef>
+        </p:style>
+        <p:txBody>
+          <a:bodyPr rtlCol="0" anchor="ctr"/>
+          <a:lstStyle/>
+          <a:p>
+            <a:pPr algn="ctr"/>
+            <a:endParaRPr kumimoji="1" lang="ja-JP" altLang="en-US"/>
+          </a:p>
+        </p:txBody>
+      </p:sp>
+      <p:cxnSp>
+        <p:nvCxnSpPr>
+          <p:cNvPr id="41" name="直線コネクタ 40">
+            <a:extLst>
+              <a:ext uri="{FF2B5EF4-FFF2-40B4-BE49-F238E27FC236}">
+                <a16:creationId xmlns:a16="http://schemas.microsoft.com/office/drawing/2014/main" id="{F73A8DA4-860A-50DF-5123-C6488BEC22D9}"/>
+              </a:ext>
+            </a:extLst>
+          </p:cNvPr>
+          <p:cNvCxnSpPr>
+            <a:stCxn id="37" idx="5"/>
+            <a:endCxn id="40" idx="0"/>
+          </p:cNvCxnSpPr>
+          <p:nvPr/>
+        </p:nvCxnSpPr>
+        <p:spPr>
+          <a:xfrm>
+            <a:off x="8123055" y="3291103"/>
+            <a:ext cx="388604" cy="645004"/>
+          </a:xfrm>
+          <a:prstGeom prst="line">
+            <a:avLst/>
+          </a:prstGeom>
+          <a:ln w="12700">
+            <a:solidFill>
+              <a:schemeClr val="tx1"/>
+            </a:solidFill>
+          </a:ln>
+        </p:spPr>
+        <p:style>
+          <a:lnRef idx="1">
+            <a:schemeClr val="accent1"/>
+          </a:lnRef>
+          <a:fillRef idx="0">
+            <a:schemeClr val="accent1"/>
+          </a:fillRef>
+          <a:effectRef idx="0">
+            <a:schemeClr val="accent1"/>
+          </a:effectRef>
+          <a:fontRef idx="minor">
+            <a:schemeClr val="tx1"/>
+          </a:fontRef>
+        </p:style>
+      </p:cxnSp>
+      <p:sp>
+        <p:nvSpPr>
+          <p:cNvPr id="42" name="円/楕円 41">
+            <a:extLst>
+              <a:ext uri="{FF2B5EF4-FFF2-40B4-BE49-F238E27FC236}">
+                <a16:creationId xmlns:a16="http://schemas.microsoft.com/office/drawing/2014/main" id="{DED5EC01-6090-111E-8EA2-033B761D18E8}"/>
+              </a:ext>
+            </a:extLst>
+          </p:cNvPr>
+          <p:cNvSpPr/>
+          <p:nvPr/>
+        </p:nvSpPr>
+        <p:spPr>
+          <a:xfrm rot="185650">
+            <a:off x="8984465" y="2981279"/>
+            <a:ext cx="326571" cy="326571"/>
+          </a:xfrm>
+          <a:prstGeom prst="ellipse">
+            <a:avLst/>
+          </a:prstGeom>
+          <a:solidFill>
+            <a:schemeClr val="accent4"/>
+          </a:solidFill>
+          <a:ln>
+            <a:solidFill>
+              <a:schemeClr val="tx1"/>
+            </a:solidFill>
+          </a:ln>
+        </p:spPr>
+        <p:style>
+          <a:lnRef idx="2">
+            <a:schemeClr val="accent1">
+              <a:shade val="50000"/>
+            </a:schemeClr>
+          </a:lnRef>
+          <a:fillRef idx="1">
+            <a:schemeClr val="accent1"/>
+          </a:fillRef>
+          <a:effectRef idx="0">
+            <a:schemeClr val="accent1"/>
+          </a:effectRef>
+          <a:fontRef idx="minor">
+            <a:schemeClr val="lt1"/>
+          </a:fontRef>
+        </p:style>
+        <p:txBody>
+          <a:bodyPr rtlCol="0" anchor="ctr"/>
+          <a:lstStyle/>
+          <a:p>
+            <a:pPr algn="ctr"/>
+            <a:endParaRPr kumimoji="1" lang="ja-JP" altLang="en-US"/>
+          </a:p>
+        </p:txBody>
+      </p:sp>
+      <p:cxnSp>
+        <p:nvCxnSpPr>
+          <p:cNvPr id="43" name="直線コネクタ 42">
+            <a:extLst>
+              <a:ext uri="{FF2B5EF4-FFF2-40B4-BE49-F238E27FC236}">
+                <a16:creationId xmlns:a16="http://schemas.microsoft.com/office/drawing/2014/main" id="{D5030D81-E21C-1E6D-3EAB-2262F72DAB09}"/>
+              </a:ext>
+            </a:extLst>
+          </p:cNvPr>
+          <p:cNvCxnSpPr>
+            <a:cxnSpLocks/>
+            <a:endCxn id="42" idx="2"/>
+          </p:cNvCxnSpPr>
+          <p:nvPr/>
+        </p:nvCxnSpPr>
+        <p:spPr>
+          <a:xfrm flipV="1">
+            <a:off x="8206071" y="3135751"/>
+            <a:ext cx="778632" cy="1395"/>
+          </a:xfrm>
+          <a:prstGeom prst="line">
+            <a:avLst/>
+          </a:prstGeom>
+          <a:ln w="12700">
+            <a:solidFill>
+              <a:schemeClr val="tx1"/>
+            </a:solidFill>
+          </a:ln>
+        </p:spPr>
+        <p:style>
+          <a:lnRef idx="1">
+            <a:schemeClr val="accent1"/>
+          </a:lnRef>
+          <a:fillRef idx="0">
+            <a:schemeClr val="accent1"/>
+          </a:fillRef>
+          <a:effectRef idx="0">
+            <a:schemeClr val="accent1"/>
+          </a:effectRef>
+          <a:fontRef idx="minor">
+            <a:schemeClr val="tx1"/>
+          </a:fontRef>
+        </p:style>
+      </p:cxnSp>
+      <p:sp>
+        <p:nvSpPr>
+          <p:cNvPr id="44" name="円/楕円 43">
+            <a:extLst>
+              <a:ext uri="{FF2B5EF4-FFF2-40B4-BE49-F238E27FC236}">
+                <a16:creationId xmlns:a16="http://schemas.microsoft.com/office/drawing/2014/main" id="{F7BEBB28-B6BE-BEF6-A787-97C736A2C3E6}"/>
+              </a:ext>
+            </a:extLst>
+          </p:cNvPr>
+          <p:cNvSpPr/>
+          <p:nvPr/>
+        </p:nvSpPr>
+        <p:spPr>
+          <a:xfrm rot="19847820">
+            <a:off x="9530723" y="3915351"/>
+            <a:ext cx="326571" cy="326571"/>
+          </a:xfrm>
+          <a:prstGeom prst="ellipse">
+            <a:avLst/>
+          </a:prstGeom>
+          <a:solidFill>
+            <a:schemeClr val="accent6"/>
+          </a:solidFill>
+          <a:ln>
+            <a:solidFill>
+              <a:schemeClr val="tx1"/>
+            </a:solidFill>
+          </a:ln>
+        </p:spPr>
+        <p:style>
+          <a:lnRef idx="2">
+            <a:schemeClr val="accent1">
+              <a:shade val="50000"/>
+            </a:schemeClr>
+          </a:lnRef>
+          <a:fillRef idx="1">
+            <a:schemeClr val="accent1"/>
+          </a:fillRef>
+          <a:effectRef idx="0">
+            <a:schemeClr val="accent1"/>
+          </a:effectRef>
+          <a:fontRef idx="minor">
+            <a:schemeClr val="lt1"/>
+          </a:fontRef>
+        </p:style>
+        <p:txBody>
+          <a:bodyPr rtlCol="0" anchor="ctr"/>
+          <a:lstStyle/>
+          <a:p>
+            <a:pPr algn="ctr"/>
+            <a:endParaRPr kumimoji="1" lang="ja-JP" altLang="en-US"/>
+          </a:p>
+        </p:txBody>
+      </p:sp>
+      <p:cxnSp>
+        <p:nvCxnSpPr>
+          <p:cNvPr id="45" name="直線コネクタ 44">
+            <a:extLst>
+              <a:ext uri="{FF2B5EF4-FFF2-40B4-BE49-F238E27FC236}">
+                <a16:creationId xmlns:a16="http://schemas.microsoft.com/office/drawing/2014/main" id="{E3F96567-20B6-7A9E-0E3D-C9E4C504F337}"/>
+              </a:ext>
+            </a:extLst>
+          </p:cNvPr>
+          <p:cNvCxnSpPr>
+            <a:cxnSpLocks/>
+          </p:cNvCxnSpPr>
+          <p:nvPr/>
+        </p:nvCxnSpPr>
+        <p:spPr>
+          <a:xfrm flipV="1">
+            <a:off x="8753351" y="4071489"/>
+            <a:ext cx="778632" cy="1395"/>
+          </a:xfrm>
+          <a:prstGeom prst="line">
+            <a:avLst/>
+          </a:prstGeom>
+          <a:ln w="12700">
+            <a:solidFill>
+              <a:schemeClr val="tx1"/>
+            </a:solidFill>
+          </a:ln>
+        </p:spPr>
+        <p:style>
+          <a:lnRef idx="1">
+            <a:schemeClr val="accent1"/>
+          </a:lnRef>
+          <a:fillRef idx="0">
+            <a:schemeClr val="accent1"/>
+          </a:fillRef>
+          <a:effectRef idx="0">
+            <a:schemeClr val="accent1"/>
+          </a:effectRef>
+          <a:fontRef idx="minor">
+            <a:schemeClr val="tx1"/>
+          </a:fontRef>
+        </p:style>
+      </p:cxnSp>
+      <p:cxnSp>
+        <p:nvCxnSpPr>
+          <p:cNvPr id="46" name="直線コネクタ 45">
+            <a:extLst>
+              <a:ext uri="{FF2B5EF4-FFF2-40B4-BE49-F238E27FC236}">
+                <a16:creationId xmlns:a16="http://schemas.microsoft.com/office/drawing/2014/main" id="{961B9CE0-5495-F133-DBEB-3B673D9D1C7C}"/>
+              </a:ext>
+            </a:extLst>
+          </p:cNvPr>
+          <p:cNvCxnSpPr/>
+          <p:nvPr/>
+        </p:nvCxnSpPr>
+        <p:spPr>
+          <a:xfrm>
+            <a:off x="9235828" y="3282243"/>
+            <a:ext cx="388604" cy="645004"/>
+          </a:xfrm>
+          <a:prstGeom prst="line">
+            <a:avLst/>
+          </a:prstGeom>
+          <a:ln w="12700">
+            <a:solidFill>
+              <a:schemeClr val="tx1"/>
+            </a:solidFill>
+          </a:ln>
+        </p:spPr>
+        <p:style>
+          <a:lnRef idx="1">
+            <a:schemeClr val="accent1"/>
+          </a:lnRef>
+          <a:fillRef idx="0">
+            <a:schemeClr val="accent1"/>
+          </a:fillRef>
+          <a:effectRef idx="0">
+            <a:schemeClr val="accent1"/>
+          </a:effectRef>
+          <a:fontRef idx="minor">
+            <a:schemeClr val="tx1"/>
+          </a:fontRef>
+        </p:style>
+      </p:cxnSp>
+      <p:cxnSp>
+        <p:nvCxnSpPr>
+          <p:cNvPr id="50" name="直線コネクタ 49">
+            <a:extLst>
+              <a:ext uri="{FF2B5EF4-FFF2-40B4-BE49-F238E27FC236}">
+                <a16:creationId xmlns:a16="http://schemas.microsoft.com/office/drawing/2014/main" id="{133C1651-AA4D-411C-751D-8C90DA535384}"/>
+              </a:ext>
+            </a:extLst>
+          </p:cNvPr>
+          <p:cNvCxnSpPr>
+            <a:cxnSpLocks/>
+          </p:cNvCxnSpPr>
+          <p:nvPr/>
+        </p:nvCxnSpPr>
+        <p:spPr>
+          <a:xfrm flipV="1">
+            <a:off x="9319612" y="3143169"/>
+            <a:ext cx="778632" cy="1395"/>
+          </a:xfrm>
+          <a:prstGeom prst="line">
+            <a:avLst/>
+          </a:prstGeom>
+          <a:ln w="12700">
+            <a:solidFill>
+              <a:schemeClr val="tx1"/>
+            </a:solidFill>
+          </a:ln>
+        </p:spPr>
+        <p:style>
+          <a:lnRef idx="1">
+            <a:schemeClr val="accent1"/>
+          </a:lnRef>
+          <a:fillRef idx="0">
+            <a:schemeClr val="accent1"/>
+          </a:fillRef>
+          <a:effectRef idx="0">
+            <a:schemeClr val="accent1"/>
+          </a:effectRef>
+          <a:fontRef idx="minor">
+            <a:schemeClr val="tx1"/>
+          </a:fontRef>
+        </p:style>
+      </p:cxnSp>
+      <p:sp>
+        <p:nvSpPr>
+          <p:cNvPr id="51" name="円/楕円 50">
+            <a:extLst>
+              <a:ext uri="{FF2B5EF4-FFF2-40B4-BE49-F238E27FC236}">
+                <a16:creationId xmlns:a16="http://schemas.microsoft.com/office/drawing/2014/main" id="{0A9D1EC6-2B8A-F97F-A343-ACDD6B1AE340}"/>
+              </a:ext>
+            </a:extLst>
+          </p:cNvPr>
+          <p:cNvSpPr/>
+          <p:nvPr/>
+        </p:nvSpPr>
+        <p:spPr>
+          <a:xfrm rot="185650">
+            <a:off x="10099696" y="2986299"/>
+            <a:ext cx="326571" cy="326571"/>
+          </a:xfrm>
+          <a:prstGeom prst="ellipse">
+            <a:avLst/>
+          </a:prstGeom>
+          <a:solidFill>
+            <a:schemeClr val="accent4"/>
+          </a:solidFill>
+          <a:ln>
+            <a:solidFill>
+              <a:schemeClr val="tx1"/>
+            </a:solidFill>
+          </a:ln>
+        </p:spPr>
+        <p:style>
+          <a:lnRef idx="2">
+            <a:schemeClr val="accent1">
+              <a:shade val="50000"/>
+            </a:schemeClr>
+          </a:lnRef>
+          <a:fillRef idx="1">
+            <a:schemeClr val="accent1"/>
+          </a:fillRef>
+          <a:effectRef idx="0">
+            <a:schemeClr val="accent1"/>
+          </a:effectRef>
+          <a:fontRef idx="minor">
+            <a:schemeClr val="lt1"/>
+          </a:fontRef>
+        </p:style>
+        <p:txBody>
+          <a:bodyPr rtlCol="0" anchor="ctr"/>
+          <a:lstStyle/>
+          <a:p>
+            <a:pPr algn="ctr"/>
+            <a:endParaRPr kumimoji="1" lang="ja-JP" altLang="en-US"/>
+          </a:p>
+        </p:txBody>
+      </p:sp>
+      <p:cxnSp>
+        <p:nvCxnSpPr>
+          <p:cNvPr id="2" name="直線コネクタ 1">
+            <a:extLst>
+              <a:ext uri="{FF2B5EF4-FFF2-40B4-BE49-F238E27FC236}">
+                <a16:creationId xmlns:a16="http://schemas.microsoft.com/office/drawing/2014/main" id="{92A77C63-A3E9-6137-47AB-5A0CA3EEE7F0}"/>
+              </a:ext>
+            </a:extLst>
+          </p:cNvPr>
+          <p:cNvCxnSpPr>
+            <a:cxnSpLocks/>
+          </p:cNvCxnSpPr>
+          <p:nvPr/>
+        </p:nvCxnSpPr>
+        <p:spPr>
+          <a:xfrm>
+            <a:off x="658174" y="5754446"/>
+            <a:ext cx="9969639" cy="0"/>
+          </a:xfrm>
+          <a:prstGeom prst="line">
+            <a:avLst/>
+          </a:prstGeom>
+          <a:ln w="19050">
+            <a:solidFill>
+              <a:schemeClr val="tx1"/>
+            </a:solidFill>
+            <a:prstDash val="dash"/>
+          </a:ln>
+        </p:spPr>
+        <p:style>
+          <a:lnRef idx="1">
+            <a:schemeClr val="dk1"/>
+          </a:lnRef>
+          <a:fillRef idx="0">
+            <a:schemeClr val="dk1"/>
+          </a:fillRef>
+          <a:effectRef idx="0">
+            <a:schemeClr val="dk1"/>
+          </a:effectRef>
+          <a:fontRef idx="minor">
+            <a:schemeClr val="tx1"/>
+          </a:fontRef>
+        </p:style>
+      </p:cxnSp>
+      <p:sp>
+        <p:nvSpPr>
+          <p:cNvPr id="4" name="円/楕円 3">
+            <a:extLst>
+              <a:ext uri="{FF2B5EF4-FFF2-40B4-BE49-F238E27FC236}">
+                <a16:creationId xmlns:a16="http://schemas.microsoft.com/office/drawing/2014/main" id="{46EE6C94-883A-3394-6516-0FFDCD80EA23}"/>
+              </a:ext>
+            </a:extLst>
+          </p:cNvPr>
+          <p:cNvSpPr/>
+          <p:nvPr/>
+        </p:nvSpPr>
+        <p:spPr>
+          <a:xfrm>
+            <a:off x="2440901" y="6406447"/>
+            <a:ext cx="326571" cy="326571"/>
+          </a:xfrm>
+          <a:prstGeom prst="ellipse">
+            <a:avLst/>
+          </a:prstGeom>
+          <a:solidFill>
+            <a:schemeClr val="accent1"/>
+          </a:solidFill>
+          <a:ln>
+            <a:solidFill>
+              <a:schemeClr val="tx1"/>
+            </a:solidFill>
+          </a:ln>
+        </p:spPr>
+        <p:style>
+          <a:lnRef idx="2">
+            <a:schemeClr val="accent1">
+              <a:shade val="50000"/>
+            </a:schemeClr>
+          </a:lnRef>
+          <a:fillRef idx="1">
+            <a:schemeClr val="accent1"/>
+          </a:fillRef>
+          <a:effectRef idx="0">
+            <a:schemeClr val="accent1"/>
+          </a:effectRef>
+          <a:fontRef idx="minor">
+            <a:schemeClr val="lt1"/>
+          </a:fontRef>
+        </p:style>
+        <p:txBody>
+          <a:bodyPr rtlCol="0" anchor="ctr"/>
+          <a:lstStyle/>
+          <a:p>
+            <a:pPr algn="ctr"/>
+            <a:endParaRPr kumimoji="1" lang="ja-JP" altLang="en-US"/>
+          </a:p>
+        </p:txBody>
+      </p:sp>
+    </p:spTree>
+    <p:extLst>
+      <p:ext uri="{BB962C8B-B14F-4D97-AF65-F5344CB8AC3E}">
+        <p14:creationId xmlns:p14="http://schemas.microsoft.com/office/powerpoint/2010/main" val="1586322899"/>
+      </p:ext>
+    </p:extLst>
+  </p:cSld>
+  <p:clrMapOvr>
+    <a:masterClrMapping/>
+  </p:clrMapOvr>
+</p:sld>
+</file>
+
+<file path=ppt/slides/slide4.xml><?xml version="1.0" encoding="utf-8"?>
+<p:sld xmlns:a="http://schemas.openxmlformats.org/drawingml/2006/main" xmlns:r="http://schemas.openxmlformats.org/officeDocument/2006/relationships" xmlns:p="http://schemas.openxmlformats.org/presentationml/2006/main">
+  <p:cSld>
+    <p:spTree>
+      <p:nvGrpSpPr>
+        <p:cNvPr id="1" name=""/>
+        <p:cNvGrpSpPr/>
+        <p:nvPr/>
+      </p:nvGrpSpPr>
+      <p:grpSpPr>
+        <a:xfrm>
+          <a:off x="0" y="0"/>
+          <a:ext cx="0" cy="0"/>
+          <a:chOff x="0" y="0"/>
+          <a:chExt cx="0" cy="0"/>
+        </a:xfrm>
+      </p:grpSpPr>
+      <p:cxnSp>
+        <p:nvCxnSpPr>
+          <p:cNvPr id="4" name="直線コネクタ 3">
+            <a:extLst>
+              <a:ext uri="{FF2B5EF4-FFF2-40B4-BE49-F238E27FC236}">
+                <a16:creationId xmlns:a16="http://schemas.microsoft.com/office/drawing/2014/main" id="{A1F80BB1-3AFD-5795-A7A7-B1BDEF6FF96E}"/>
+              </a:ext>
+            </a:extLst>
+          </p:cNvPr>
+          <p:cNvCxnSpPr>
+            <a:cxnSpLocks/>
+          </p:cNvCxnSpPr>
+          <p:nvPr/>
+        </p:nvCxnSpPr>
+        <p:spPr>
+          <a:xfrm>
+            <a:off x="86497" y="3241905"/>
+            <a:ext cx="11738919" cy="0"/>
+          </a:xfrm>
+          <a:prstGeom prst="line">
+            <a:avLst/>
+          </a:prstGeom>
+          <a:ln w="19050">
+            <a:solidFill>
+              <a:schemeClr val="tx1"/>
+            </a:solidFill>
+            <a:prstDash val="dash"/>
+          </a:ln>
+        </p:spPr>
+        <p:style>
+          <a:lnRef idx="1">
+            <a:schemeClr val="dk1"/>
+          </a:lnRef>
+          <a:fillRef idx="0">
+            <a:schemeClr val="dk1"/>
+          </a:fillRef>
+          <a:effectRef idx="0">
+            <a:schemeClr val="dk1"/>
+          </a:effectRef>
+          <a:fontRef idx="minor">
+            <a:schemeClr val="tx1"/>
+          </a:fontRef>
+        </p:style>
+      </p:cxnSp>
+      <p:cxnSp>
+        <p:nvCxnSpPr>
+          <p:cNvPr id="5" name="直線コネクタ 4">
+            <a:extLst>
+              <a:ext uri="{FF2B5EF4-FFF2-40B4-BE49-F238E27FC236}">
+                <a16:creationId xmlns:a16="http://schemas.microsoft.com/office/drawing/2014/main" id="{8C6AEA12-F188-0475-7506-AD56A55C387D}"/>
+              </a:ext>
+            </a:extLst>
+          </p:cNvPr>
+          <p:cNvCxnSpPr>
+            <a:cxnSpLocks/>
+          </p:cNvCxnSpPr>
+          <p:nvPr/>
+        </p:nvCxnSpPr>
+        <p:spPr>
+          <a:xfrm>
+            <a:off x="86497" y="4283991"/>
+            <a:ext cx="11738919" cy="0"/>
+          </a:xfrm>
+          <a:prstGeom prst="line">
+            <a:avLst/>
+          </a:prstGeom>
+          <a:ln w="19050">
+            <a:solidFill>
+              <a:schemeClr val="tx1"/>
+            </a:solidFill>
+            <a:prstDash val="dash"/>
+          </a:ln>
+        </p:spPr>
+        <p:style>
+          <a:lnRef idx="1">
+            <a:schemeClr val="dk1"/>
+          </a:lnRef>
+          <a:fillRef idx="0">
+            <a:schemeClr val="dk1"/>
+          </a:fillRef>
+          <a:effectRef idx="0">
+            <a:schemeClr val="dk1"/>
+          </a:effectRef>
+          <a:fontRef idx="minor">
+            <a:schemeClr val="tx1"/>
+          </a:fontRef>
+        </p:style>
+      </p:cxnSp>
+      <p:sp>
+        <p:nvSpPr>
+          <p:cNvPr id="6" name="円/楕円 5">
+            <a:extLst>
+              <a:ext uri="{FF2B5EF4-FFF2-40B4-BE49-F238E27FC236}">
+                <a16:creationId xmlns:a16="http://schemas.microsoft.com/office/drawing/2014/main" id="{934194B6-6EE3-F52E-327F-9D1BB3F4BC08}"/>
+              </a:ext>
+            </a:extLst>
+          </p:cNvPr>
+          <p:cNvSpPr/>
+          <p:nvPr/>
+        </p:nvSpPr>
+        <p:spPr>
+          <a:xfrm rot="18900000">
+            <a:off x="1075313" y="3599663"/>
+            <a:ext cx="326571" cy="326571"/>
+          </a:xfrm>
+          <a:prstGeom prst="ellipse">
+            <a:avLst/>
+          </a:prstGeom>
+          <a:solidFill>
+            <a:schemeClr val="accent6"/>
+          </a:solidFill>
+          <a:ln>
+            <a:solidFill>
+              <a:schemeClr val="tx1"/>
+            </a:solidFill>
+          </a:ln>
+        </p:spPr>
+        <p:style>
+          <a:lnRef idx="2">
+            <a:schemeClr val="accent1">
+              <a:shade val="50000"/>
+            </a:schemeClr>
+          </a:lnRef>
+          <a:fillRef idx="1">
+            <a:schemeClr val="accent1"/>
+          </a:fillRef>
+          <a:effectRef idx="0">
+            <a:schemeClr val="accent1"/>
+          </a:effectRef>
+          <a:fontRef idx="minor">
+            <a:schemeClr val="lt1"/>
+          </a:fontRef>
+        </p:style>
+        <p:txBody>
+          <a:bodyPr rtlCol="0" anchor="ctr"/>
+          <a:lstStyle/>
+          <a:p>
+            <a:pPr algn="ctr"/>
+            <a:endParaRPr kumimoji="1" lang="ja-JP" altLang="en-US"/>
+          </a:p>
+        </p:txBody>
+      </p:sp>
+      <p:sp>
+        <p:nvSpPr>
+          <p:cNvPr id="7" name="円/楕円 6">
+            <a:extLst>
+              <a:ext uri="{FF2B5EF4-FFF2-40B4-BE49-F238E27FC236}">
+                <a16:creationId xmlns:a16="http://schemas.microsoft.com/office/drawing/2014/main" id="{0486D37D-21C8-A746-CCD3-20F8C0B2C38D}"/>
+              </a:ext>
+            </a:extLst>
+          </p:cNvPr>
+          <p:cNvSpPr/>
+          <p:nvPr/>
+        </p:nvSpPr>
+        <p:spPr>
+          <a:xfrm>
+            <a:off x="2366761" y="2394291"/>
+            <a:ext cx="326571" cy="326571"/>
+          </a:xfrm>
+          <a:prstGeom prst="ellipse">
+            <a:avLst/>
+          </a:prstGeom>
+          <a:solidFill>
+            <a:schemeClr val="accent4"/>
+          </a:solidFill>
+          <a:ln>
+            <a:solidFill>
+              <a:schemeClr val="tx1"/>
+            </a:solidFill>
+          </a:ln>
+        </p:spPr>
+        <p:style>
+          <a:lnRef idx="2">
+            <a:schemeClr val="accent1">
+              <a:shade val="50000"/>
+            </a:schemeClr>
+          </a:lnRef>
+          <a:fillRef idx="1">
+            <a:schemeClr val="accent1"/>
+          </a:fillRef>
+          <a:effectRef idx="0">
+            <a:schemeClr val="accent1"/>
+          </a:effectRef>
+          <a:fontRef idx="minor">
+            <a:schemeClr val="lt1"/>
+          </a:fontRef>
+        </p:style>
+        <p:txBody>
+          <a:bodyPr rtlCol="0" anchor="ctr"/>
+          <a:lstStyle/>
+          <a:p>
+            <a:pPr algn="ctr"/>
+            <a:endParaRPr kumimoji="1" lang="ja-JP" altLang="en-US"/>
+          </a:p>
+        </p:txBody>
+      </p:sp>
+      <p:sp>
+        <p:nvSpPr>
+          <p:cNvPr id="8" name="円/楕円 7">
+            <a:extLst>
+              <a:ext uri="{FF2B5EF4-FFF2-40B4-BE49-F238E27FC236}">
+                <a16:creationId xmlns:a16="http://schemas.microsoft.com/office/drawing/2014/main" id="{99E32192-0EE4-C092-6D80-6EE29B1C973B}"/>
+              </a:ext>
+            </a:extLst>
+          </p:cNvPr>
+          <p:cNvSpPr/>
+          <p:nvPr/>
+        </p:nvSpPr>
+        <p:spPr>
+          <a:xfrm>
+            <a:off x="2366760" y="4800067"/>
+            <a:ext cx="326571" cy="326571"/>
+          </a:xfrm>
+          <a:prstGeom prst="ellipse">
+            <a:avLst/>
+          </a:prstGeom>
+          <a:solidFill>
+            <a:schemeClr val="accent1"/>
+          </a:solidFill>
+          <a:ln>
+            <a:solidFill>
+              <a:schemeClr val="tx1"/>
+            </a:solidFill>
+          </a:ln>
+        </p:spPr>
+        <p:style>
+          <a:lnRef idx="2">
+            <a:schemeClr val="accent1">
+              <a:shade val="50000"/>
+            </a:schemeClr>
+          </a:lnRef>
+          <a:fillRef idx="1">
+            <a:schemeClr val="accent1"/>
+          </a:fillRef>
+          <a:effectRef idx="0">
+            <a:schemeClr val="accent1"/>
+          </a:effectRef>
+          <a:fontRef idx="minor">
+            <a:schemeClr val="lt1"/>
+          </a:fontRef>
+        </p:style>
+        <p:txBody>
+          <a:bodyPr rtlCol="0" anchor="ctr"/>
+          <a:lstStyle/>
+          <a:p>
+            <a:pPr algn="ctr"/>
+            <a:endParaRPr kumimoji="1" lang="ja-JP" altLang="en-US"/>
+          </a:p>
+        </p:txBody>
+      </p:sp>
+      <p:sp>
+        <p:nvSpPr>
+          <p:cNvPr id="9" name="円/楕円 8">
+            <a:extLst>
+              <a:ext uri="{FF2B5EF4-FFF2-40B4-BE49-F238E27FC236}">
+                <a16:creationId xmlns:a16="http://schemas.microsoft.com/office/drawing/2014/main" id="{AADC9EF0-BE00-31FA-49E7-304B8FA329E3}"/>
+              </a:ext>
+            </a:extLst>
+          </p:cNvPr>
+          <p:cNvSpPr/>
+          <p:nvPr/>
+        </p:nvSpPr>
+        <p:spPr>
+          <a:xfrm>
+            <a:off x="4733744" y="4800066"/>
+            <a:ext cx="326571" cy="326571"/>
+          </a:xfrm>
+          <a:prstGeom prst="ellipse">
+            <a:avLst/>
+          </a:prstGeom>
+          <a:solidFill>
+            <a:schemeClr val="accent1"/>
+          </a:solidFill>
+          <a:ln>
+            <a:solidFill>
+              <a:schemeClr val="tx1"/>
+            </a:solidFill>
+          </a:ln>
+        </p:spPr>
+        <p:style>
+          <a:lnRef idx="2">
+            <a:schemeClr val="accent1">
+              <a:shade val="50000"/>
+            </a:schemeClr>
+          </a:lnRef>
+          <a:fillRef idx="1">
+            <a:schemeClr val="accent1"/>
+          </a:fillRef>
+          <a:effectRef idx="0">
+            <a:schemeClr val="accent1"/>
+          </a:effectRef>
+          <a:fontRef idx="minor">
+            <a:schemeClr val="lt1"/>
+          </a:fontRef>
+        </p:style>
+        <p:txBody>
+          <a:bodyPr rtlCol="0" anchor="ctr"/>
+          <a:lstStyle/>
+          <a:p>
+            <a:pPr algn="ctr"/>
+            <a:endParaRPr kumimoji="1" lang="ja-JP" altLang="en-US"/>
+          </a:p>
+        </p:txBody>
+      </p:sp>
+      <p:sp>
+        <p:nvSpPr>
+          <p:cNvPr id="10" name="円/楕円 9">
+            <a:extLst>
+              <a:ext uri="{FF2B5EF4-FFF2-40B4-BE49-F238E27FC236}">
+                <a16:creationId xmlns:a16="http://schemas.microsoft.com/office/drawing/2014/main" id="{FB3A5236-1EB1-1748-2939-1C7887635A5D}"/>
+              </a:ext>
+            </a:extLst>
+          </p:cNvPr>
+          <p:cNvSpPr/>
+          <p:nvPr/>
+        </p:nvSpPr>
+        <p:spPr>
+          <a:xfrm>
+            <a:off x="6786370" y="4800066"/>
+            <a:ext cx="326571" cy="326571"/>
+          </a:xfrm>
+          <a:prstGeom prst="ellipse">
+            <a:avLst/>
+          </a:prstGeom>
+          <a:solidFill>
+            <a:schemeClr val="accent1"/>
+          </a:solidFill>
+          <a:ln>
+            <a:solidFill>
+              <a:schemeClr val="tx1"/>
+            </a:solidFill>
+          </a:ln>
+        </p:spPr>
+        <p:style>
+          <a:lnRef idx="2">
+            <a:schemeClr val="accent1">
+              <a:shade val="50000"/>
+            </a:schemeClr>
+          </a:lnRef>
+          <a:fillRef idx="1">
+            <a:schemeClr val="accent1"/>
+          </a:fillRef>
+          <a:effectRef idx="0">
+            <a:schemeClr val="accent1"/>
+          </a:effectRef>
+          <a:fontRef idx="minor">
+            <a:schemeClr val="lt1"/>
+          </a:fontRef>
+        </p:style>
+        <p:txBody>
+          <a:bodyPr rtlCol="0" anchor="ctr"/>
+          <a:lstStyle/>
+          <a:p>
+            <a:pPr algn="ctr"/>
+            <a:endParaRPr kumimoji="1" lang="ja-JP" altLang="en-US"/>
+          </a:p>
+        </p:txBody>
+      </p:sp>
+      <p:sp>
+        <p:nvSpPr>
+          <p:cNvPr id="11" name="円/楕円 10">
+            <a:extLst>
+              <a:ext uri="{FF2B5EF4-FFF2-40B4-BE49-F238E27FC236}">
+                <a16:creationId xmlns:a16="http://schemas.microsoft.com/office/drawing/2014/main" id="{E0B25699-F7B6-3D0A-57FD-41AB323F8D45}"/>
+              </a:ext>
+            </a:extLst>
+          </p:cNvPr>
+          <p:cNvSpPr/>
+          <p:nvPr/>
+        </p:nvSpPr>
+        <p:spPr>
+          <a:xfrm>
+            <a:off x="4001973" y="2394290"/>
+            <a:ext cx="326571" cy="326571"/>
+          </a:xfrm>
+          <a:prstGeom prst="ellipse">
+            <a:avLst/>
+          </a:prstGeom>
+          <a:solidFill>
+            <a:schemeClr val="accent4"/>
+          </a:solidFill>
+          <a:ln>
+            <a:solidFill>
+              <a:schemeClr val="tx1"/>
+            </a:solidFill>
+          </a:ln>
+        </p:spPr>
+        <p:style>
+          <a:lnRef idx="2">
+            <a:schemeClr val="accent1">
+              <a:shade val="50000"/>
+            </a:schemeClr>
+          </a:lnRef>
+          <a:fillRef idx="1">
+            <a:schemeClr val="accent1"/>
+          </a:fillRef>
+          <a:effectRef idx="0">
+            <a:schemeClr val="accent1"/>
+          </a:effectRef>
+          <a:fontRef idx="minor">
+            <a:schemeClr val="lt1"/>
+          </a:fontRef>
+        </p:style>
+        <p:txBody>
+          <a:bodyPr rtlCol="0" anchor="ctr"/>
+          <a:lstStyle/>
+          <a:p>
+            <a:pPr algn="ctr"/>
+            <a:endParaRPr kumimoji="1" lang="ja-JP" altLang="en-US"/>
+          </a:p>
+        </p:txBody>
+      </p:sp>
+      <p:sp>
+        <p:nvSpPr>
+          <p:cNvPr id="12" name="円/楕円 11">
+            <a:extLst>
+              <a:ext uri="{FF2B5EF4-FFF2-40B4-BE49-F238E27FC236}">
+                <a16:creationId xmlns:a16="http://schemas.microsoft.com/office/drawing/2014/main" id="{77E7C409-5262-B21D-0623-E484B6204C57}"/>
+              </a:ext>
+            </a:extLst>
+          </p:cNvPr>
+          <p:cNvSpPr/>
+          <p:nvPr/>
+        </p:nvSpPr>
+        <p:spPr>
+          <a:xfrm rot="18902593">
+            <a:off x="5126370" y="3599663"/>
+            <a:ext cx="326571" cy="326571"/>
+          </a:xfrm>
+          <a:prstGeom prst="ellipse">
+            <a:avLst/>
+          </a:prstGeom>
+          <a:solidFill>
+            <a:schemeClr val="accent6"/>
+          </a:solidFill>
+          <a:ln>
+            <a:solidFill>
+              <a:schemeClr val="tx1"/>
+            </a:solidFill>
+          </a:ln>
+        </p:spPr>
+        <p:style>
+          <a:lnRef idx="2">
+            <a:schemeClr val="accent1">
+              <a:shade val="50000"/>
+            </a:schemeClr>
+          </a:lnRef>
+          <a:fillRef idx="1">
+            <a:schemeClr val="accent1"/>
+          </a:fillRef>
+          <a:effectRef idx="0">
+            <a:schemeClr val="accent1"/>
+          </a:effectRef>
+          <a:fontRef idx="minor">
+            <a:schemeClr val="lt1"/>
+          </a:fontRef>
+        </p:style>
+        <p:txBody>
+          <a:bodyPr rtlCol="0" anchor="ctr"/>
+          <a:lstStyle/>
+          <a:p>
+            <a:pPr algn="ctr"/>
+            <a:endParaRPr kumimoji="1" lang="ja-JP" altLang="en-US"/>
+          </a:p>
+        </p:txBody>
+      </p:sp>
+      <p:sp>
+        <p:nvSpPr>
+          <p:cNvPr id="13" name="円/楕円 12">
+            <a:extLst>
+              <a:ext uri="{FF2B5EF4-FFF2-40B4-BE49-F238E27FC236}">
+                <a16:creationId xmlns:a16="http://schemas.microsoft.com/office/drawing/2014/main" id="{6D1DE60F-0AD6-AFB8-9DC0-464DA133BAB4}"/>
+              </a:ext>
+            </a:extLst>
+          </p:cNvPr>
+          <p:cNvSpPr/>
+          <p:nvPr/>
+        </p:nvSpPr>
+        <p:spPr>
+          <a:xfrm rot="18887421">
+            <a:off x="8733027" y="3606804"/>
+            <a:ext cx="326571" cy="326571"/>
+          </a:xfrm>
+          <a:prstGeom prst="ellipse">
+            <a:avLst/>
+          </a:prstGeom>
+          <a:solidFill>
+            <a:schemeClr val="accent6"/>
+          </a:solidFill>
+          <a:ln>
+            <a:solidFill>
+              <a:schemeClr val="tx1"/>
+            </a:solidFill>
+          </a:ln>
+        </p:spPr>
+        <p:style>
+          <a:lnRef idx="2">
+            <a:schemeClr val="accent1">
+              <a:shade val="50000"/>
+            </a:schemeClr>
+          </a:lnRef>
+          <a:fillRef idx="1">
+            <a:schemeClr val="accent1"/>
+          </a:fillRef>
+          <a:effectRef idx="0">
+            <a:schemeClr val="accent1"/>
+          </a:effectRef>
+          <a:fontRef idx="minor">
+            <a:schemeClr val="lt1"/>
+          </a:fontRef>
+        </p:style>
+        <p:txBody>
+          <a:bodyPr rtlCol="0" anchor="ctr"/>
+          <a:lstStyle/>
+          <a:p>
+            <a:pPr algn="ctr"/>
+            <a:endParaRPr kumimoji="1" lang="ja-JP" altLang="en-US"/>
+          </a:p>
+        </p:txBody>
+      </p:sp>
+      <p:cxnSp>
+        <p:nvCxnSpPr>
+          <p:cNvPr id="20" name="直線コネクタ 19">
+            <a:extLst>
+              <a:ext uri="{FF2B5EF4-FFF2-40B4-BE49-F238E27FC236}">
+                <a16:creationId xmlns:a16="http://schemas.microsoft.com/office/drawing/2014/main" id="{CD8725D3-4089-22C0-2EFA-3AB71C0F8FB3}"/>
+              </a:ext>
+            </a:extLst>
+          </p:cNvPr>
+          <p:cNvCxnSpPr>
+            <a:cxnSpLocks/>
+            <a:stCxn id="6" idx="5"/>
+            <a:endCxn id="12" idx="1"/>
+          </p:cNvCxnSpPr>
+          <p:nvPr/>
+        </p:nvCxnSpPr>
+        <p:spPr>
+          <a:xfrm flipV="1">
+            <a:off x="1401884" y="3762825"/>
+            <a:ext cx="3724486" cy="124"/>
+          </a:xfrm>
+          <a:prstGeom prst="line">
+            <a:avLst/>
+          </a:prstGeom>
+          <a:ln w="28575">
+            <a:solidFill>
+              <a:srgbClr val="92D050"/>
+            </a:solidFill>
+          </a:ln>
+        </p:spPr>
+        <p:style>
+          <a:lnRef idx="1">
+            <a:schemeClr val="dk1"/>
+          </a:lnRef>
+          <a:fillRef idx="0">
+            <a:schemeClr val="dk1"/>
+          </a:fillRef>
+          <a:effectRef idx="0">
+            <a:schemeClr val="dk1"/>
+          </a:effectRef>
+          <a:fontRef idx="minor">
+            <a:schemeClr val="tx1"/>
+          </a:fontRef>
+        </p:style>
+      </p:cxnSp>
+      <p:cxnSp>
+        <p:nvCxnSpPr>
+          <p:cNvPr id="26" name="直線コネクタ 25">
+            <a:extLst>
+              <a:ext uri="{FF2B5EF4-FFF2-40B4-BE49-F238E27FC236}">
+                <a16:creationId xmlns:a16="http://schemas.microsoft.com/office/drawing/2014/main" id="{83195DBA-7997-3081-B2AB-E2A44A184B4B}"/>
+              </a:ext>
+            </a:extLst>
+          </p:cNvPr>
+          <p:cNvCxnSpPr>
+            <a:cxnSpLocks/>
+            <a:stCxn id="12" idx="5"/>
+            <a:endCxn id="13" idx="1"/>
+          </p:cNvCxnSpPr>
+          <p:nvPr/>
+        </p:nvCxnSpPr>
+        <p:spPr>
+          <a:xfrm>
+            <a:off x="5452941" y="3763072"/>
+            <a:ext cx="3280087" cy="7615"/>
+          </a:xfrm>
+          <a:prstGeom prst="line">
+            <a:avLst/>
+          </a:prstGeom>
+          <a:ln w="28575">
+            <a:solidFill>
+              <a:srgbClr val="92D050"/>
+            </a:solidFill>
+          </a:ln>
+        </p:spPr>
+        <p:style>
+          <a:lnRef idx="1">
+            <a:schemeClr val="dk1"/>
+          </a:lnRef>
+          <a:fillRef idx="0">
+            <a:schemeClr val="dk1"/>
+          </a:fillRef>
+          <a:effectRef idx="0">
+            <a:schemeClr val="dk1"/>
+          </a:effectRef>
+          <a:fontRef idx="minor">
+            <a:schemeClr val="tx1"/>
+          </a:fontRef>
+        </p:style>
+      </p:cxnSp>
+      <p:cxnSp>
+        <p:nvCxnSpPr>
+          <p:cNvPr id="33" name="直線コネクタ 32">
+            <a:extLst>
+              <a:ext uri="{FF2B5EF4-FFF2-40B4-BE49-F238E27FC236}">
+                <a16:creationId xmlns:a16="http://schemas.microsoft.com/office/drawing/2014/main" id="{D39E63B3-6144-2D21-0FE2-5F606DA0429A}"/>
+              </a:ext>
+            </a:extLst>
+          </p:cNvPr>
+          <p:cNvCxnSpPr>
+            <a:cxnSpLocks/>
+            <a:stCxn id="6" idx="6"/>
+            <a:endCxn id="7" idx="3"/>
+          </p:cNvCxnSpPr>
+          <p:nvPr/>
+        </p:nvCxnSpPr>
+        <p:spPr>
+          <a:xfrm flipV="1">
+            <a:off x="1354059" y="2673037"/>
+            <a:ext cx="1060527" cy="974452"/>
+          </a:xfrm>
+          <a:prstGeom prst="line">
+            <a:avLst/>
+          </a:prstGeom>
+          <a:ln w="28575"/>
+        </p:spPr>
+        <p:style>
+          <a:lnRef idx="1">
+            <a:schemeClr val="accent4"/>
+          </a:lnRef>
+          <a:fillRef idx="0">
+            <a:schemeClr val="accent4"/>
+          </a:fillRef>
+          <a:effectRef idx="0">
+            <a:schemeClr val="accent4"/>
+          </a:effectRef>
+          <a:fontRef idx="minor">
+            <a:schemeClr val="tx1"/>
+          </a:fontRef>
+        </p:style>
+      </p:cxnSp>
+      <p:cxnSp>
+        <p:nvCxnSpPr>
+          <p:cNvPr id="36" name="直線コネクタ 35">
+            <a:extLst>
+              <a:ext uri="{FF2B5EF4-FFF2-40B4-BE49-F238E27FC236}">
+                <a16:creationId xmlns:a16="http://schemas.microsoft.com/office/drawing/2014/main" id="{B9F9186D-3229-3A64-149B-82A35C3B4871}"/>
+              </a:ext>
+            </a:extLst>
+          </p:cNvPr>
+          <p:cNvCxnSpPr>
+            <a:cxnSpLocks/>
+            <a:stCxn id="7" idx="6"/>
+            <a:endCxn id="11" idx="2"/>
+          </p:cNvCxnSpPr>
+          <p:nvPr/>
+        </p:nvCxnSpPr>
+        <p:spPr>
+          <a:xfrm flipV="1">
+            <a:off x="2693332" y="2557576"/>
+            <a:ext cx="1308641" cy="1"/>
+          </a:xfrm>
+          <a:prstGeom prst="line">
+            <a:avLst/>
+          </a:prstGeom>
+          <a:ln w="28575"/>
+        </p:spPr>
+        <p:style>
+          <a:lnRef idx="3">
+            <a:schemeClr val="accent4"/>
+          </a:lnRef>
+          <a:fillRef idx="0">
+            <a:schemeClr val="accent4"/>
+          </a:fillRef>
+          <a:effectRef idx="2">
+            <a:schemeClr val="accent4"/>
+          </a:effectRef>
+          <a:fontRef idx="minor">
+            <a:schemeClr val="tx1"/>
+          </a:fontRef>
+        </p:style>
+      </p:cxnSp>
+      <p:cxnSp>
+        <p:nvCxnSpPr>
+          <p:cNvPr id="39" name="直線コネクタ 38">
+            <a:extLst>
+              <a:ext uri="{FF2B5EF4-FFF2-40B4-BE49-F238E27FC236}">
+                <a16:creationId xmlns:a16="http://schemas.microsoft.com/office/drawing/2014/main" id="{D61455C2-1AAF-91BA-CE16-338D2EF93B2D}"/>
+              </a:ext>
+            </a:extLst>
+          </p:cNvPr>
+          <p:cNvCxnSpPr>
+            <a:cxnSpLocks/>
+            <a:stCxn id="11" idx="5"/>
+            <a:endCxn id="12" idx="0"/>
+          </p:cNvCxnSpPr>
+          <p:nvPr/>
+        </p:nvCxnSpPr>
+        <p:spPr>
+          <a:xfrm>
+            <a:off x="4280719" y="2673036"/>
+            <a:ext cx="893564" cy="974365"/>
+          </a:xfrm>
+          <a:prstGeom prst="line">
+            <a:avLst/>
+          </a:prstGeom>
+          <a:ln w="28575"/>
+        </p:spPr>
+        <p:style>
+          <a:lnRef idx="3">
+            <a:schemeClr val="accent4"/>
+          </a:lnRef>
+          <a:fillRef idx="0">
+            <a:schemeClr val="accent4"/>
+          </a:fillRef>
+          <a:effectRef idx="2">
+            <a:schemeClr val="accent4"/>
+          </a:effectRef>
+          <a:fontRef idx="minor">
+            <a:schemeClr val="tx1"/>
+          </a:fontRef>
+        </p:style>
+      </p:cxnSp>
+      <p:cxnSp>
+        <p:nvCxnSpPr>
+          <p:cNvPr id="42" name="直線コネクタ 41">
+            <a:extLst>
+              <a:ext uri="{FF2B5EF4-FFF2-40B4-BE49-F238E27FC236}">
+                <a16:creationId xmlns:a16="http://schemas.microsoft.com/office/drawing/2014/main" id="{0E3E1BC8-BF01-DC6F-3CDA-ADBAC364DB6A}"/>
+              </a:ext>
+            </a:extLst>
+          </p:cNvPr>
+          <p:cNvCxnSpPr>
+            <a:cxnSpLocks/>
+            <a:stCxn id="8" idx="1"/>
+            <a:endCxn id="6" idx="4"/>
+          </p:cNvCxnSpPr>
+          <p:nvPr/>
+        </p:nvCxnSpPr>
+        <p:spPr>
+          <a:xfrm flipH="1" flipV="1">
+            <a:off x="1354059" y="3878408"/>
+            <a:ext cx="1060526" cy="969484"/>
+          </a:xfrm>
+          <a:prstGeom prst="line">
+            <a:avLst/>
+          </a:prstGeom>
+          <a:ln w="28575"/>
+        </p:spPr>
+        <p:style>
+          <a:lnRef idx="1">
+            <a:schemeClr val="accent1"/>
+          </a:lnRef>
+          <a:fillRef idx="0">
+            <a:schemeClr val="accent1"/>
+          </a:fillRef>
+          <a:effectRef idx="0">
+            <a:schemeClr val="accent1"/>
+          </a:effectRef>
+          <a:fontRef idx="minor">
+            <a:schemeClr val="tx1"/>
+          </a:fontRef>
+        </p:style>
+      </p:cxnSp>
+      <p:cxnSp>
+        <p:nvCxnSpPr>
+          <p:cNvPr id="45" name="直線コネクタ 44">
+            <a:extLst>
+              <a:ext uri="{FF2B5EF4-FFF2-40B4-BE49-F238E27FC236}">
+                <a16:creationId xmlns:a16="http://schemas.microsoft.com/office/drawing/2014/main" id="{AF4C4CD1-0F7F-6115-E689-454F28F040BD}"/>
+              </a:ext>
+            </a:extLst>
+          </p:cNvPr>
+          <p:cNvCxnSpPr>
+            <a:cxnSpLocks/>
+            <a:stCxn id="9" idx="2"/>
+            <a:endCxn id="8" idx="6"/>
+          </p:cNvCxnSpPr>
+          <p:nvPr/>
+        </p:nvCxnSpPr>
+        <p:spPr>
+          <a:xfrm flipH="1">
+            <a:off x="2693331" y="4963352"/>
+            <a:ext cx="2040413" cy="1"/>
+          </a:xfrm>
+          <a:prstGeom prst="line">
+            <a:avLst/>
+          </a:prstGeom>
+          <a:ln w="28575"/>
+        </p:spPr>
+        <p:style>
+          <a:lnRef idx="1">
+            <a:schemeClr val="accent1"/>
+          </a:lnRef>
+          <a:fillRef idx="0">
+            <a:schemeClr val="accent1"/>
+          </a:fillRef>
+          <a:effectRef idx="0">
+            <a:schemeClr val="accent1"/>
+          </a:effectRef>
+          <a:fontRef idx="minor">
+            <a:schemeClr val="tx1"/>
+          </a:fontRef>
+        </p:style>
+      </p:cxnSp>
+      <p:cxnSp>
+        <p:nvCxnSpPr>
+          <p:cNvPr id="48" name="直線コネクタ 47">
+            <a:extLst>
+              <a:ext uri="{FF2B5EF4-FFF2-40B4-BE49-F238E27FC236}">
+                <a16:creationId xmlns:a16="http://schemas.microsoft.com/office/drawing/2014/main" id="{68468D97-3176-6441-9FE2-9ADFE2CCAC58}"/>
+              </a:ext>
+            </a:extLst>
+          </p:cNvPr>
+          <p:cNvCxnSpPr>
+            <a:cxnSpLocks/>
+            <a:stCxn id="10" idx="2"/>
+            <a:endCxn id="9" idx="6"/>
+          </p:cNvCxnSpPr>
+          <p:nvPr/>
+        </p:nvCxnSpPr>
+        <p:spPr>
+          <a:xfrm flipH="1">
+            <a:off x="5060315" y="4963352"/>
+            <a:ext cx="1726055" cy="0"/>
+          </a:xfrm>
+          <a:prstGeom prst="line">
+            <a:avLst/>
+          </a:prstGeom>
+          <a:ln w="28575"/>
+        </p:spPr>
+        <p:style>
+          <a:lnRef idx="1">
+            <a:schemeClr val="accent1"/>
+          </a:lnRef>
+          <a:fillRef idx="0">
+            <a:schemeClr val="accent1"/>
+          </a:fillRef>
+          <a:effectRef idx="0">
+            <a:schemeClr val="accent1"/>
+          </a:effectRef>
+          <a:fontRef idx="minor">
+            <a:schemeClr val="tx1"/>
+          </a:fontRef>
+        </p:style>
+      </p:cxnSp>
+      <p:cxnSp>
+        <p:nvCxnSpPr>
+          <p:cNvPr id="51" name="直線コネクタ 50">
+            <a:extLst>
+              <a:ext uri="{FF2B5EF4-FFF2-40B4-BE49-F238E27FC236}">
+                <a16:creationId xmlns:a16="http://schemas.microsoft.com/office/drawing/2014/main" id="{8DA35783-0B74-E790-F7A6-2C4BC66BB348}"/>
+              </a:ext>
+            </a:extLst>
+          </p:cNvPr>
+          <p:cNvCxnSpPr>
+            <a:cxnSpLocks/>
+            <a:stCxn id="13" idx="2"/>
+          </p:cNvCxnSpPr>
+          <p:nvPr/>
+        </p:nvCxnSpPr>
+        <p:spPr>
+          <a:xfrm flipH="1">
+            <a:off x="7112941" y="3885972"/>
+            <a:ext cx="1668335" cy="1006226"/>
+          </a:xfrm>
+          <a:prstGeom prst="line">
+            <a:avLst/>
+          </a:prstGeom>
+          <a:ln w="28575"/>
+        </p:spPr>
+        <p:style>
+          <a:lnRef idx="1">
+            <a:schemeClr val="accent1"/>
+          </a:lnRef>
+          <a:fillRef idx="0">
+            <a:schemeClr val="accent1"/>
+          </a:fillRef>
+          <a:effectRef idx="0">
+            <a:schemeClr val="accent1"/>
+          </a:effectRef>
+          <a:fontRef idx="minor">
+            <a:schemeClr val="tx1"/>
+          </a:fontRef>
+        </p:style>
+      </p:cxnSp>
+      <p:sp>
+        <p:nvSpPr>
+          <p:cNvPr id="57" name="テキスト ボックス 56">
+            <a:extLst>
+              <a:ext uri="{FF2B5EF4-FFF2-40B4-BE49-F238E27FC236}">
+                <a16:creationId xmlns:a16="http://schemas.microsoft.com/office/drawing/2014/main" id="{5E047754-0511-9B7E-D97F-C56217E9A24E}"/>
+              </a:ext>
+            </a:extLst>
+          </p:cNvPr>
+          <p:cNvSpPr txBox="1"/>
+          <p:nvPr/>
+        </p:nvSpPr>
+        <p:spPr>
+          <a:xfrm>
+            <a:off x="10259140" y="3532027"/>
+            <a:ext cx="1631092" cy="369332"/>
+          </a:xfrm>
+          <a:prstGeom prst="rect">
+            <a:avLst/>
+          </a:prstGeom>
+          <a:noFill/>
+        </p:spPr>
+        <p:txBody>
+          <a:bodyPr wrap="square" rtlCol="0">
+            <a:spAutoFit/>
+          </a:bodyPr>
+          <a:lstStyle/>
+          <a:p>
+            <a:r>
+              <a:rPr lang="en-US" altLang="ja-JP" dirty="0">
+                <a:latin typeface="HGSSoeiKakugothicUB" panose="020B0900000000000000" pitchFamily="34" charset="-128"/>
+                <a:ea typeface="HGSSoeiKakugothicUB" panose="020B0900000000000000" pitchFamily="34" charset="-128"/>
+              </a:rPr>
+              <a:t>m</a:t>
+            </a:r>
+            <a:r>
+              <a:rPr kumimoji="1" lang="en-US" altLang="ja-JP" dirty="0">
+                <a:latin typeface="HGSSoeiKakugothicUB" panose="020B0900000000000000" pitchFamily="34" charset="-128"/>
+                <a:ea typeface="HGSSoeiKakugothicUB" panose="020B0900000000000000" pitchFamily="34" charset="-128"/>
+              </a:rPr>
+              <a:t>ain</a:t>
+            </a:r>
+            <a:r>
+              <a:rPr kumimoji="1" lang="ja-JP" altLang="en-US">
+                <a:latin typeface="HGSSoeiKakugothicUB" panose="020B0900000000000000" pitchFamily="34" charset="-128"/>
+                <a:ea typeface="HGSSoeiKakugothicUB" panose="020B0900000000000000" pitchFamily="34" charset="-128"/>
+              </a:rPr>
+              <a:t>ブランチ</a:t>
+            </a:r>
+          </a:p>
+        </p:txBody>
+      </p:sp>
+      <p:sp>
+        <p:nvSpPr>
+          <p:cNvPr id="58" name="テキスト ボックス 57">
+            <a:extLst>
+              <a:ext uri="{FF2B5EF4-FFF2-40B4-BE49-F238E27FC236}">
+                <a16:creationId xmlns:a16="http://schemas.microsoft.com/office/drawing/2014/main" id="{9A21DD57-A941-42A3-1536-E21C2CB9687D}"/>
+              </a:ext>
+            </a:extLst>
+          </p:cNvPr>
+          <p:cNvSpPr txBox="1"/>
+          <p:nvPr/>
+        </p:nvSpPr>
+        <p:spPr>
+          <a:xfrm>
+            <a:off x="9638270" y="2716174"/>
+            <a:ext cx="2187146" cy="367134"/>
+          </a:xfrm>
+          <a:prstGeom prst="rect">
+            <a:avLst/>
+          </a:prstGeom>
+          <a:noFill/>
+        </p:spPr>
+        <p:txBody>
+          <a:bodyPr wrap="square" rtlCol="0">
+            <a:spAutoFit/>
+          </a:bodyPr>
+          <a:lstStyle/>
+          <a:p>
+            <a:r>
+              <a:rPr kumimoji="1" lang="ja-JP" altLang="en-US">
+                <a:latin typeface="HGSSoeiKakugothicUB" panose="020B0900000000000000" pitchFamily="34" charset="-128"/>
+                <a:ea typeface="HGSSoeiKakugothicUB" panose="020B0900000000000000" pitchFamily="34" charset="-128"/>
+              </a:rPr>
+              <a:t>トピックブランチ</a:t>
+            </a:r>
+            <a:r>
+              <a:rPr kumimoji="1" lang="en-US" altLang="ja-JP" dirty="0">
+                <a:latin typeface="HGSSoeiKakugothicUB" panose="020B0900000000000000" pitchFamily="34" charset="-128"/>
+                <a:ea typeface="HGSSoeiKakugothicUB" panose="020B0900000000000000" pitchFamily="34" charset="-128"/>
+              </a:rPr>
+              <a:t>A</a:t>
+            </a:r>
+            <a:endParaRPr kumimoji="1" lang="ja-JP" altLang="en-US">
+              <a:latin typeface="HGSSoeiKakugothicUB" panose="020B0900000000000000" pitchFamily="34" charset="-128"/>
+              <a:ea typeface="HGSSoeiKakugothicUB" panose="020B0900000000000000" pitchFamily="34" charset="-128"/>
+            </a:endParaRPr>
+          </a:p>
+        </p:txBody>
+      </p:sp>
+      <p:sp>
+        <p:nvSpPr>
+          <p:cNvPr id="61" name="テキスト ボックス 60">
+            <a:extLst>
+              <a:ext uri="{FF2B5EF4-FFF2-40B4-BE49-F238E27FC236}">
+                <a16:creationId xmlns:a16="http://schemas.microsoft.com/office/drawing/2014/main" id="{CF58C44D-F7DB-A5D5-F60F-B40C01766EC8}"/>
+              </a:ext>
+            </a:extLst>
+          </p:cNvPr>
+          <p:cNvSpPr txBox="1"/>
+          <p:nvPr/>
+        </p:nvSpPr>
+        <p:spPr>
+          <a:xfrm>
+            <a:off x="9645891" y="4437900"/>
+            <a:ext cx="2187146" cy="367134"/>
+          </a:xfrm>
+          <a:prstGeom prst="rect">
+            <a:avLst/>
+          </a:prstGeom>
+          <a:noFill/>
+        </p:spPr>
+        <p:txBody>
+          <a:bodyPr wrap="square" rtlCol="0">
+            <a:spAutoFit/>
+          </a:bodyPr>
+          <a:lstStyle/>
+          <a:p>
+            <a:r>
+              <a:rPr kumimoji="1" lang="ja-JP" altLang="en-US">
+                <a:latin typeface="HGSSoeiKakugothicUB" panose="020B0900000000000000" pitchFamily="34" charset="-128"/>
+                <a:ea typeface="HGSSoeiKakugothicUB" panose="020B0900000000000000" pitchFamily="34" charset="-128"/>
+              </a:rPr>
+              <a:t>トピックブランチ</a:t>
+            </a:r>
+            <a:r>
+              <a:rPr lang="en-US" altLang="ja-JP" dirty="0">
+                <a:latin typeface="HGSSoeiKakugothicUB" panose="020B0900000000000000" pitchFamily="34" charset="-128"/>
+                <a:ea typeface="HGSSoeiKakugothicUB" panose="020B0900000000000000" pitchFamily="34" charset="-128"/>
+              </a:rPr>
+              <a:t>B</a:t>
+            </a:r>
+            <a:endParaRPr kumimoji="1" lang="ja-JP" altLang="en-US">
+              <a:latin typeface="HGSSoeiKakugothicUB" panose="020B0900000000000000" pitchFamily="34" charset="-128"/>
+              <a:ea typeface="HGSSoeiKakugothicUB" panose="020B0900000000000000" pitchFamily="34" charset="-128"/>
+            </a:endParaRPr>
+          </a:p>
+        </p:txBody>
+      </p:sp>
+      <p:sp>
+        <p:nvSpPr>
+          <p:cNvPr id="62" name="正方形/長方形 61">
+            <a:extLst>
+              <a:ext uri="{FF2B5EF4-FFF2-40B4-BE49-F238E27FC236}">
+                <a16:creationId xmlns:a16="http://schemas.microsoft.com/office/drawing/2014/main" id="{4AE1E811-65B7-A496-5FB3-8452370EE168}"/>
+              </a:ext>
+            </a:extLst>
+          </p:cNvPr>
+          <p:cNvSpPr/>
+          <p:nvPr/>
+        </p:nvSpPr>
+        <p:spPr>
+          <a:xfrm>
+            <a:off x="238375" y="4583375"/>
+            <a:ext cx="1782429" cy="563883"/>
+          </a:xfrm>
+          <a:prstGeom prst="rect">
+            <a:avLst/>
+          </a:prstGeom>
+          <a:ln>
+            <a:solidFill>
+              <a:schemeClr val="tx1"/>
+            </a:solidFill>
+          </a:ln>
+        </p:spPr>
+        <p:style>
+          <a:lnRef idx="2">
+            <a:schemeClr val="accent1">
+              <a:shade val="50000"/>
+            </a:schemeClr>
+          </a:lnRef>
+          <a:fillRef idx="1">
+            <a:schemeClr val="accent1"/>
+          </a:fillRef>
+          <a:effectRef idx="0">
+            <a:schemeClr val="accent1"/>
+          </a:effectRef>
+          <a:fontRef idx="minor">
+            <a:schemeClr val="lt1"/>
+          </a:fontRef>
+        </p:style>
+        <p:txBody>
+          <a:bodyPr rtlCol="0" anchor="ctr"/>
+          <a:lstStyle/>
+          <a:p>
+            <a:pPr algn="ctr"/>
+            <a:r>
+              <a:rPr kumimoji="1" lang="ja-JP" altLang="en-US">
+                <a:latin typeface="HGPSoeiKakugothicUB" panose="020B0900000000000000" pitchFamily="34" charset="-128"/>
+                <a:ea typeface="HGPSoeiKakugothicUB" panose="020B0900000000000000" pitchFamily="34" charset="-128"/>
+              </a:rPr>
+              <a:t>トピックブランチの分岐</a:t>
+            </a:r>
+          </a:p>
+        </p:txBody>
+      </p:sp>
+      <p:sp>
+        <p:nvSpPr>
+          <p:cNvPr id="71" name="正方形/長方形 70">
+            <a:extLst>
+              <a:ext uri="{FF2B5EF4-FFF2-40B4-BE49-F238E27FC236}">
+                <a16:creationId xmlns:a16="http://schemas.microsoft.com/office/drawing/2014/main" id="{54B8CCBD-26C0-0706-7931-BC733EE8EBE0}"/>
+              </a:ext>
+            </a:extLst>
+          </p:cNvPr>
+          <p:cNvSpPr/>
+          <p:nvPr/>
+        </p:nvSpPr>
+        <p:spPr>
+          <a:xfrm>
+            <a:off x="7814090" y="4562754"/>
+            <a:ext cx="1782429" cy="563883"/>
+          </a:xfrm>
+          <a:prstGeom prst="rect">
+            <a:avLst/>
+          </a:prstGeom>
+          <a:ln>
+            <a:solidFill>
+              <a:schemeClr val="tx1"/>
+            </a:solidFill>
+          </a:ln>
+        </p:spPr>
+        <p:style>
+          <a:lnRef idx="2">
+            <a:schemeClr val="accent1">
+              <a:shade val="50000"/>
+            </a:schemeClr>
+          </a:lnRef>
+          <a:fillRef idx="1">
+            <a:schemeClr val="accent1"/>
+          </a:fillRef>
+          <a:effectRef idx="0">
+            <a:schemeClr val="accent1"/>
+          </a:effectRef>
+          <a:fontRef idx="minor">
+            <a:schemeClr val="lt1"/>
+          </a:fontRef>
+        </p:style>
+        <p:txBody>
+          <a:bodyPr rtlCol="0" anchor="ctr"/>
+          <a:lstStyle/>
+          <a:p>
+            <a:pPr algn="ctr"/>
+            <a:r>
+              <a:rPr kumimoji="1" lang="ja-JP" altLang="en-US">
+                <a:latin typeface="HGPSoeiKakugothicUB" panose="020B0900000000000000" pitchFamily="34" charset="-128"/>
+                <a:ea typeface="HGPSoeiKakugothicUB" panose="020B0900000000000000" pitchFamily="34" charset="-128"/>
+              </a:rPr>
+              <a:t>プルリクエスト</a:t>
+            </a:r>
+          </a:p>
+        </p:txBody>
+      </p:sp>
+      <p:sp>
+        <p:nvSpPr>
+          <p:cNvPr id="72" name="正方形/長方形 71">
+            <a:extLst>
+              <a:ext uri="{FF2B5EF4-FFF2-40B4-BE49-F238E27FC236}">
+                <a16:creationId xmlns:a16="http://schemas.microsoft.com/office/drawing/2014/main" id="{1788A9A3-07B4-AC8C-82B5-B07BBFEA1DB2}"/>
+              </a:ext>
+            </a:extLst>
+          </p:cNvPr>
+          <p:cNvSpPr/>
+          <p:nvPr/>
+        </p:nvSpPr>
+        <p:spPr>
+          <a:xfrm>
+            <a:off x="238375" y="2359938"/>
+            <a:ext cx="1782429" cy="563883"/>
+          </a:xfrm>
+          <a:prstGeom prst="rect">
+            <a:avLst/>
+          </a:prstGeom>
+          <a:solidFill>
+            <a:schemeClr val="accent4"/>
+          </a:solidFill>
+          <a:ln>
+            <a:solidFill>
+              <a:schemeClr val="tx1"/>
+            </a:solidFill>
+          </a:ln>
+        </p:spPr>
+        <p:style>
+          <a:lnRef idx="2">
+            <a:schemeClr val="accent1">
+              <a:shade val="50000"/>
+            </a:schemeClr>
+          </a:lnRef>
+          <a:fillRef idx="1">
+            <a:schemeClr val="accent1"/>
+          </a:fillRef>
+          <a:effectRef idx="0">
+            <a:schemeClr val="accent1"/>
+          </a:effectRef>
+          <a:fontRef idx="minor">
+            <a:schemeClr val="lt1"/>
+          </a:fontRef>
+        </p:style>
+        <p:txBody>
+          <a:bodyPr rtlCol="0" anchor="ctr"/>
+          <a:lstStyle/>
+          <a:p>
+            <a:pPr algn="ctr"/>
+            <a:r>
+              <a:rPr kumimoji="1" lang="ja-JP" altLang="en-US">
+                <a:latin typeface="HGPSoeiKakugothicUB" panose="020B0900000000000000" pitchFamily="34" charset="-128"/>
+                <a:ea typeface="HGPSoeiKakugothicUB" panose="020B0900000000000000" pitchFamily="34" charset="-128"/>
+              </a:rPr>
+              <a:t>トピックブランチの分岐</a:t>
+            </a:r>
+          </a:p>
+        </p:txBody>
+      </p:sp>
+      <p:sp>
+        <p:nvSpPr>
+          <p:cNvPr id="73" name="正方形/長方形 72">
+            <a:extLst>
+              <a:ext uri="{FF2B5EF4-FFF2-40B4-BE49-F238E27FC236}">
+                <a16:creationId xmlns:a16="http://schemas.microsoft.com/office/drawing/2014/main" id="{D30DF54D-11CB-9BB8-7BC7-7C1DF1260F3E}"/>
+              </a:ext>
+            </a:extLst>
+          </p:cNvPr>
+          <p:cNvSpPr/>
+          <p:nvPr/>
+        </p:nvSpPr>
+        <p:spPr>
+          <a:xfrm>
+            <a:off x="4675981" y="2251020"/>
+            <a:ext cx="1782429" cy="563883"/>
+          </a:xfrm>
+          <a:prstGeom prst="rect">
+            <a:avLst/>
+          </a:prstGeom>
+          <a:solidFill>
+            <a:schemeClr val="accent4"/>
+          </a:solidFill>
+          <a:ln>
+            <a:solidFill>
+              <a:schemeClr val="tx1"/>
+            </a:solidFill>
+          </a:ln>
+        </p:spPr>
+        <p:style>
+          <a:lnRef idx="2">
+            <a:schemeClr val="accent1">
+              <a:shade val="50000"/>
+            </a:schemeClr>
+          </a:lnRef>
+          <a:fillRef idx="1">
+            <a:schemeClr val="accent1"/>
+          </a:fillRef>
+          <a:effectRef idx="0">
+            <a:schemeClr val="accent1"/>
+          </a:effectRef>
+          <a:fontRef idx="minor">
+            <a:schemeClr val="lt1"/>
+          </a:fontRef>
+        </p:style>
+        <p:txBody>
+          <a:bodyPr rtlCol="0" anchor="ctr"/>
+          <a:lstStyle/>
+          <a:p>
+            <a:pPr algn="ctr"/>
+            <a:r>
+              <a:rPr kumimoji="1" lang="ja-JP" altLang="en-US">
+                <a:latin typeface="HGPSoeiKakugothicUB" panose="020B0900000000000000" pitchFamily="34" charset="-128"/>
+                <a:ea typeface="HGPSoeiKakugothicUB" panose="020B0900000000000000" pitchFamily="34" charset="-128"/>
+              </a:rPr>
+              <a:t>プルリクエスト</a:t>
+            </a:r>
+          </a:p>
+        </p:txBody>
+      </p:sp>
+    </p:spTree>
+    <p:extLst>
+      <p:ext uri="{BB962C8B-B14F-4D97-AF65-F5344CB8AC3E}">
+        <p14:creationId xmlns:p14="http://schemas.microsoft.com/office/powerpoint/2010/main" val="3069334420"/>
+      </p:ext>
+    </p:extLst>
+  </p:cSld>
+  <p:clrMapOvr>
+    <a:masterClrMapping/>
+  </p:clrMapOvr>
+</p:sld>
+</file>
+
 <file path=ppt/theme/theme1.xml><?xml version="1.0" encoding="utf-8"?>
 <a:theme xmlns:a="http://schemas.openxmlformats.org/drawingml/2006/main" name="Office テーマ">
   <a:themeElements>

</xml_diff>